<commit_message>
Update images for Event command in UserGuide.adoc
</commit_message>
<xml_diff>
--- a/docs/diagrams/Command_Event.pptx
+++ b/docs/diagrams/Command_Event.pptx
@@ -5,13 +5,16 @@
     <p:sldMasterId id="2147483648" r:id="rId1"/>
   </p:sldMasterIdLst>
   <p:notesMasterIdLst>
-    <p:notesMasterId r:id="rId6"/>
+    <p:notesMasterId r:id="rId9"/>
   </p:notesMasterIdLst>
   <p:sldIdLst>
-    <p:sldId id="257" r:id="rId2"/>
-    <p:sldId id="258" r:id="rId3"/>
-    <p:sldId id="256" r:id="rId4"/>
-    <p:sldId id="259" r:id="rId5"/>
+    <p:sldId id="260" r:id="rId2"/>
+    <p:sldId id="261" r:id="rId3"/>
+    <p:sldId id="262" r:id="rId4"/>
+    <p:sldId id="257" r:id="rId5"/>
+    <p:sldId id="258" r:id="rId6"/>
+    <p:sldId id="256" r:id="rId7"/>
+    <p:sldId id="259" r:id="rId8"/>
   </p:sldIdLst>
   <p:sldSz cx="12192000" cy="6858000"/>
   <p:notesSz cx="6858000" cy="9144000"/>
@@ -110,6 +113,11 @@
       </a:defRPr>
     </a:lvl9pPr>
   </p:defaultTextStyle>
+  <p:extLst>
+    <p:ext uri="{EFAFB233-063F-42B5-8137-9DF3F51BA10A}">
+      <p15:sldGuideLst xmlns:p15="http://schemas.microsoft.com/office/powerpoint/2012/main"/>
+    </p:ext>
+  </p:extLst>
 </p:presentation>
 </file>
 
@@ -195,7 +203,7 @@
           <a:p>
             <a:fld id="{88FCF8A4-4925-4635-B32F-EA7CEC81441A}" type="datetimeFigureOut">
               <a:rPr lang="en-SG" smtClean="0"/>
-              <a:t>30/10/2018</a:t>
+              <a:t>31/10/2018</a:t>
             </a:fld>
             <a:endParaRPr lang="en-SG"/>
           </a:p>
@@ -508,9 +516,19 @@
           <a:lstStyle/>
           <a:p>
             <a:r>
-              <a:rPr lang="en-SG" dirty="0"/>
-              <a:t>Add event- after1</a:t>
-            </a:r>
+              <a:rPr lang="en-US" dirty="0"/>
+              <a:t>Add event – Event Index</a:t>
+            </a:r>
+          </a:p>
+          <a:p>
+            <a:endParaRPr lang="en-US" dirty="0"/>
+          </a:p>
+          <a:p>
+            <a:r>
+              <a:rPr lang="en-US" dirty="0"/>
+              <a:t>C: The EVENT_INDEX</a:t>
+            </a:r>
+            <a:endParaRPr lang="en-SG" dirty="0"/>
           </a:p>
         </p:txBody>
       </p:sp>
@@ -540,7 +558,7 @@
     </p:spTree>
     <p:extLst>
       <p:ext uri="{BB962C8B-B14F-4D97-AF65-F5344CB8AC3E}">
-        <p14:creationId xmlns:p14="http://schemas.microsoft.com/office/powerpoint/2010/main" val="3390705064"/>
+        <p14:creationId xmlns:p14="http://schemas.microsoft.com/office/powerpoint/2010/main" val="3726095554"/>
       </p:ext>
     </p:extLst>
   </p:cSld>
@@ -595,9 +613,16 @@
           <a:lstStyle/>
           <a:p>
             <a:r>
-              <a:rPr lang="en-SG" dirty="0"/>
-              <a:t>Add event- after2</a:t>
-            </a:r>
+              <a:rPr lang="en-US" dirty="0"/>
+              <a:t>Example: </a:t>
+            </a:r>
+          </a:p>
+          <a:p>
+            <a:r>
+              <a:rPr lang="en-US" dirty="0"/>
+              <a:t>C: Before adding an event</a:t>
+            </a:r>
+            <a:endParaRPr lang="en-SG" dirty="0"/>
           </a:p>
         </p:txBody>
       </p:sp>
@@ -627,7 +652,7 @@
     </p:spTree>
     <p:extLst>
       <p:ext uri="{BB962C8B-B14F-4D97-AF65-F5344CB8AC3E}">
-        <p14:creationId xmlns:p14="http://schemas.microsoft.com/office/powerpoint/2010/main" val="2124717986"/>
+        <p14:creationId xmlns:p14="http://schemas.microsoft.com/office/powerpoint/2010/main" val="1736216025"/>
       </p:ext>
     </p:extLst>
   </p:cSld>
@@ -681,10 +706,150 @@
           <a:bodyPr/>
           <a:lstStyle/>
           <a:p>
+            <a:pPr marL="0" marR="0" lvl="0" indent="0" algn="l" defTabSz="914400" rtl="0" eaLnBrk="1" fontAlgn="auto" latinLnBrk="0" hangingPunct="1">
+              <a:lnSpc>
+                <a:spcPct val="100000"/>
+              </a:lnSpc>
+              <a:spcBef>
+                <a:spcPts val="0"/>
+              </a:spcBef>
+              <a:spcAft>
+                <a:spcPts val="0"/>
+              </a:spcAft>
+              <a:buClrTx/>
+              <a:buSzTx/>
+              <a:buFontTx/>
+              <a:buNone/>
+              <a:tabLst/>
+              <a:defRPr/>
+            </a:pPr>
+            <a:r>
+              <a:rPr lang="en-US" dirty="0"/>
+              <a:t>C: Output of `</a:t>
+            </a:r>
             <a:r>
               <a:rPr lang="en-SG" dirty="0"/>
-              <a:t>Update event-Before</a:t>
-            </a:r>
+              <a:t>add n/Flag Day 2018 l/</a:t>
+            </a:r>
+            <a:r>
+              <a:rPr lang="fr-FR" dirty="0" err="1"/>
+              <a:t>Tampines</a:t>
+            </a:r>
+            <a:r>
+              <a:rPr lang="fr-FR" dirty="0"/>
+              <a:t> MRT Station (EW2), 20 </a:t>
+            </a:r>
+            <a:r>
+              <a:rPr lang="fr-FR" dirty="0" err="1"/>
+              <a:t>Tampines</a:t>
+            </a:r>
+            <a:r>
+              <a:rPr lang="fr-FR" dirty="0"/>
+              <a:t> Central 1 529538</a:t>
+            </a:r>
+            <a:r>
+              <a:rPr lang="en-SG" dirty="0"/>
+              <a:t> </a:t>
+            </a:r>
+            <a:r>
+              <a:rPr lang="en-SG" dirty="0" err="1"/>
+              <a:t>sd</a:t>
+            </a:r>
+            <a:r>
+              <a:rPr lang="en-SG" dirty="0"/>
+              <a:t>/05-12-2018 ed/05-12-2018 </a:t>
+            </a:r>
+            <a:r>
+              <a:rPr lang="en-SG" dirty="0" err="1"/>
+              <a:t>st</a:t>
+            </a:r>
+            <a:r>
+              <a:rPr lang="en-SG" dirty="0"/>
+              <a:t>/09:00 et/17:00 d/Raising funds and spreading awareness for a cause. t/Fundraising`</a:t>
+            </a:r>
+            <a:endParaRPr lang="en-US" dirty="0"/>
+          </a:p>
+          <a:p>
+            <a:pPr marL="0" marR="0" lvl="0" indent="0" algn="l" defTabSz="914400" rtl="0" eaLnBrk="1" fontAlgn="auto" latinLnBrk="0" hangingPunct="1">
+              <a:lnSpc>
+                <a:spcPct val="100000"/>
+              </a:lnSpc>
+              <a:spcBef>
+                <a:spcPts val="0"/>
+              </a:spcBef>
+              <a:spcAft>
+                <a:spcPts val="0"/>
+              </a:spcAft>
+              <a:buClrTx/>
+              <a:buSzTx/>
+              <a:buFontTx/>
+              <a:buNone/>
+              <a:tabLst/>
+              <a:defRPr/>
+            </a:pPr>
+            <a:endParaRPr lang="en-SG" dirty="0"/>
+          </a:p>
+          <a:p>
+            <a:pPr marL="0" marR="0" lvl="0" indent="0" algn="l" defTabSz="914400" rtl="0" eaLnBrk="1" fontAlgn="auto" latinLnBrk="0" hangingPunct="1">
+              <a:lnSpc>
+                <a:spcPct val="100000"/>
+              </a:lnSpc>
+              <a:spcBef>
+                <a:spcPts val="0"/>
+              </a:spcBef>
+              <a:spcAft>
+                <a:spcPts val="0"/>
+              </a:spcAft>
+              <a:buClrTx/>
+              <a:buSzTx/>
+              <a:buFontTx/>
+              <a:buNone/>
+              <a:tabLst/>
+              <a:defRPr/>
+            </a:pPr>
+            <a:r>
+              <a:rPr lang="en-SG" dirty="0"/>
+              <a:t>add n/Flag Day 2018 l/</a:t>
+            </a:r>
+            <a:r>
+              <a:rPr lang="fr-FR" dirty="0" err="1"/>
+              <a:t>Tampines</a:t>
+            </a:r>
+            <a:r>
+              <a:rPr lang="fr-FR" dirty="0"/>
+              <a:t> MRT Station (EW2), 20 </a:t>
+            </a:r>
+            <a:r>
+              <a:rPr lang="fr-FR" dirty="0" err="1"/>
+              <a:t>Tampines</a:t>
+            </a:r>
+            <a:r>
+              <a:rPr lang="fr-FR" dirty="0"/>
+              <a:t> Central 1 529538</a:t>
+            </a:r>
+            <a:r>
+              <a:rPr lang="en-SG" dirty="0"/>
+              <a:t> </a:t>
+            </a:r>
+            <a:r>
+              <a:rPr lang="en-SG" dirty="0" err="1"/>
+              <a:t>sd</a:t>
+            </a:r>
+            <a:r>
+              <a:rPr lang="en-SG" dirty="0"/>
+              <a:t>/05-12-2018 ed/05-12-2018 </a:t>
+            </a:r>
+            <a:r>
+              <a:rPr lang="en-SG" dirty="0" err="1"/>
+              <a:t>st</a:t>
+            </a:r>
+            <a:r>
+              <a:rPr lang="en-SG" dirty="0"/>
+              <a:t>/09:00 et/17:00 d/Raising funds and spreading awareness for a cause. t/Fundraising</a:t>
+            </a:r>
+          </a:p>
+          <a:p>
+            <a:endParaRPr lang="en-SG" dirty="0"/>
           </a:p>
         </p:txBody>
       </p:sp>
@@ -714,7 +879,7 @@
     </p:spTree>
     <p:extLst>
       <p:ext uri="{BB962C8B-B14F-4D97-AF65-F5344CB8AC3E}">
-        <p14:creationId xmlns:p14="http://schemas.microsoft.com/office/powerpoint/2010/main" val="690589657"/>
+        <p14:creationId xmlns:p14="http://schemas.microsoft.com/office/powerpoint/2010/main" val="813284006"/>
       </p:ext>
     </p:extLst>
   </p:cSld>
@@ -770,7 +935,7 @@
           <a:p>
             <a:r>
               <a:rPr lang="en-SG" dirty="0"/>
-              <a:t>Update event-After</a:t>
+              <a:t>Add event- after1</a:t>
             </a:r>
           </a:p>
         </p:txBody>
@@ -793,6 +958,267 @@
             <a:fld id="{B95B430D-E7DD-4DF8-8575-3B92DE16C99B}" type="slidenum">
               <a:rPr lang="en-SG" smtClean="0"/>
               <a:t>4</a:t>
+            </a:fld>
+            <a:endParaRPr lang="en-SG"/>
+          </a:p>
+        </p:txBody>
+      </p:sp>
+    </p:spTree>
+    <p:extLst>
+      <p:ext uri="{BB962C8B-B14F-4D97-AF65-F5344CB8AC3E}">
+        <p14:creationId xmlns:p14="http://schemas.microsoft.com/office/powerpoint/2010/main" val="3390705064"/>
+      </p:ext>
+    </p:extLst>
+  </p:cSld>
+  <p:clrMapOvr>
+    <a:masterClrMapping/>
+  </p:clrMapOvr>
+</p:notes>
+</file>
+
+<file path=ppt/notesSlides/notesSlide5.xml><?xml version="1.0" encoding="utf-8"?>
+<p:notes xmlns:a="http://schemas.openxmlformats.org/drawingml/2006/main" xmlns:r="http://schemas.openxmlformats.org/officeDocument/2006/relationships" xmlns:p="http://schemas.openxmlformats.org/presentationml/2006/main">
+  <p:cSld>
+    <p:spTree>
+      <p:nvGrpSpPr>
+        <p:cNvPr id="1" name=""/>
+        <p:cNvGrpSpPr/>
+        <p:nvPr/>
+      </p:nvGrpSpPr>
+      <p:grpSpPr>
+        <a:xfrm>
+          <a:off x="0" y="0"/>
+          <a:ext cx="0" cy="0"/>
+          <a:chOff x="0" y="0"/>
+          <a:chExt cx="0" cy="0"/>
+        </a:xfrm>
+      </p:grpSpPr>
+      <p:sp>
+        <p:nvSpPr>
+          <p:cNvPr id="2" name="Slide Image Placeholder 1"/>
+          <p:cNvSpPr>
+            <a:spLocks noGrp="1" noRot="1" noChangeAspect="1"/>
+          </p:cNvSpPr>
+          <p:nvPr>
+            <p:ph type="sldImg"/>
+          </p:nvPr>
+        </p:nvSpPr>
+        <p:spPr/>
+      </p:sp>
+      <p:sp>
+        <p:nvSpPr>
+          <p:cNvPr id="3" name="Notes Placeholder 2"/>
+          <p:cNvSpPr>
+            <a:spLocks noGrp="1"/>
+          </p:cNvSpPr>
+          <p:nvPr>
+            <p:ph type="body" idx="1"/>
+          </p:nvPr>
+        </p:nvSpPr>
+        <p:spPr/>
+        <p:txBody>
+          <a:bodyPr/>
+          <a:lstStyle/>
+          <a:p>
+            <a:r>
+              <a:rPr lang="en-SG" dirty="0"/>
+              <a:t>Add event- after2</a:t>
+            </a:r>
+          </a:p>
+        </p:txBody>
+      </p:sp>
+      <p:sp>
+        <p:nvSpPr>
+          <p:cNvPr id="4" name="Slide Number Placeholder 3"/>
+          <p:cNvSpPr>
+            <a:spLocks noGrp="1"/>
+          </p:cNvSpPr>
+          <p:nvPr>
+            <p:ph type="sldNum" sz="quarter" idx="5"/>
+          </p:nvPr>
+        </p:nvSpPr>
+        <p:spPr/>
+        <p:txBody>
+          <a:bodyPr/>
+          <a:lstStyle/>
+          <a:p>
+            <a:fld id="{B95B430D-E7DD-4DF8-8575-3B92DE16C99B}" type="slidenum">
+              <a:rPr lang="en-SG" smtClean="0"/>
+              <a:t>5</a:t>
+            </a:fld>
+            <a:endParaRPr lang="en-SG"/>
+          </a:p>
+        </p:txBody>
+      </p:sp>
+    </p:spTree>
+    <p:extLst>
+      <p:ext uri="{BB962C8B-B14F-4D97-AF65-F5344CB8AC3E}">
+        <p14:creationId xmlns:p14="http://schemas.microsoft.com/office/powerpoint/2010/main" val="2124717986"/>
+      </p:ext>
+    </p:extLst>
+  </p:cSld>
+  <p:clrMapOvr>
+    <a:masterClrMapping/>
+  </p:clrMapOvr>
+</p:notes>
+</file>
+
+<file path=ppt/notesSlides/notesSlide6.xml><?xml version="1.0" encoding="utf-8"?>
+<p:notes xmlns:a="http://schemas.openxmlformats.org/drawingml/2006/main" xmlns:r="http://schemas.openxmlformats.org/officeDocument/2006/relationships" xmlns:p="http://schemas.openxmlformats.org/presentationml/2006/main">
+  <p:cSld>
+    <p:spTree>
+      <p:nvGrpSpPr>
+        <p:cNvPr id="1" name=""/>
+        <p:cNvGrpSpPr/>
+        <p:nvPr/>
+      </p:nvGrpSpPr>
+      <p:grpSpPr>
+        <a:xfrm>
+          <a:off x="0" y="0"/>
+          <a:ext cx="0" cy="0"/>
+          <a:chOff x="0" y="0"/>
+          <a:chExt cx="0" cy="0"/>
+        </a:xfrm>
+      </p:grpSpPr>
+      <p:sp>
+        <p:nvSpPr>
+          <p:cNvPr id="2" name="Slide Image Placeholder 1"/>
+          <p:cNvSpPr>
+            <a:spLocks noGrp="1" noRot="1" noChangeAspect="1"/>
+          </p:cNvSpPr>
+          <p:nvPr>
+            <p:ph type="sldImg"/>
+          </p:nvPr>
+        </p:nvSpPr>
+        <p:spPr/>
+      </p:sp>
+      <p:sp>
+        <p:nvSpPr>
+          <p:cNvPr id="3" name="Notes Placeholder 2"/>
+          <p:cNvSpPr>
+            <a:spLocks noGrp="1"/>
+          </p:cNvSpPr>
+          <p:nvPr>
+            <p:ph type="body" idx="1"/>
+          </p:nvPr>
+        </p:nvSpPr>
+        <p:spPr/>
+        <p:txBody>
+          <a:bodyPr/>
+          <a:lstStyle/>
+          <a:p>
+            <a:r>
+              <a:rPr lang="en-SG" dirty="0"/>
+              <a:t>Update event-Before</a:t>
+            </a:r>
+          </a:p>
+        </p:txBody>
+      </p:sp>
+      <p:sp>
+        <p:nvSpPr>
+          <p:cNvPr id="4" name="Slide Number Placeholder 3"/>
+          <p:cNvSpPr>
+            <a:spLocks noGrp="1"/>
+          </p:cNvSpPr>
+          <p:nvPr>
+            <p:ph type="sldNum" sz="quarter" idx="5"/>
+          </p:nvPr>
+        </p:nvSpPr>
+        <p:spPr/>
+        <p:txBody>
+          <a:bodyPr/>
+          <a:lstStyle/>
+          <a:p>
+            <a:fld id="{B95B430D-E7DD-4DF8-8575-3B92DE16C99B}" type="slidenum">
+              <a:rPr lang="en-SG" smtClean="0"/>
+              <a:t>6</a:t>
+            </a:fld>
+            <a:endParaRPr lang="en-SG"/>
+          </a:p>
+        </p:txBody>
+      </p:sp>
+    </p:spTree>
+    <p:extLst>
+      <p:ext uri="{BB962C8B-B14F-4D97-AF65-F5344CB8AC3E}">
+        <p14:creationId xmlns:p14="http://schemas.microsoft.com/office/powerpoint/2010/main" val="690589657"/>
+      </p:ext>
+    </p:extLst>
+  </p:cSld>
+  <p:clrMapOvr>
+    <a:masterClrMapping/>
+  </p:clrMapOvr>
+</p:notes>
+</file>
+
+<file path=ppt/notesSlides/notesSlide7.xml><?xml version="1.0" encoding="utf-8"?>
+<p:notes xmlns:a="http://schemas.openxmlformats.org/drawingml/2006/main" xmlns:r="http://schemas.openxmlformats.org/officeDocument/2006/relationships" xmlns:p="http://schemas.openxmlformats.org/presentationml/2006/main">
+  <p:cSld>
+    <p:spTree>
+      <p:nvGrpSpPr>
+        <p:cNvPr id="1" name=""/>
+        <p:cNvGrpSpPr/>
+        <p:nvPr/>
+      </p:nvGrpSpPr>
+      <p:grpSpPr>
+        <a:xfrm>
+          <a:off x="0" y="0"/>
+          <a:ext cx="0" cy="0"/>
+          <a:chOff x="0" y="0"/>
+          <a:chExt cx="0" cy="0"/>
+        </a:xfrm>
+      </p:grpSpPr>
+      <p:sp>
+        <p:nvSpPr>
+          <p:cNvPr id="2" name="Slide Image Placeholder 1"/>
+          <p:cNvSpPr>
+            <a:spLocks noGrp="1" noRot="1" noChangeAspect="1"/>
+          </p:cNvSpPr>
+          <p:nvPr>
+            <p:ph type="sldImg"/>
+          </p:nvPr>
+        </p:nvSpPr>
+        <p:spPr/>
+      </p:sp>
+      <p:sp>
+        <p:nvSpPr>
+          <p:cNvPr id="3" name="Notes Placeholder 2"/>
+          <p:cNvSpPr>
+            <a:spLocks noGrp="1"/>
+          </p:cNvSpPr>
+          <p:nvPr>
+            <p:ph type="body" idx="1"/>
+          </p:nvPr>
+        </p:nvSpPr>
+        <p:spPr/>
+        <p:txBody>
+          <a:bodyPr/>
+          <a:lstStyle/>
+          <a:p>
+            <a:r>
+              <a:rPr lang="en-SG" dirty="0"/>
+              <a:t>Update event-After</a:t>
+            </a:r>
+          </a:p>
+        </p:txBody>
+      </p:sp>
+      <p:sp>
+        <p:nvSpPr>
+          <p:cNvPr id="4" name="Slide Number Placeholder 3"/>
+          <p:cNvSpPr>
+            <a:spLocks noGrp="1"/>
+          </p:cNvSpPr>
+          <p:nvPr>
+            <p:ph type="sldNum" sz="quarter" idx="5"/>
+          </p:nvPr>
+        </p:nvSpPr>
+        <p:spPr/>
+        <p:txBody>
+          <a:bodyPr/>
+          <a:lstStyle/>
+          <a:p>
+            <a:fld id="{B95B430D-E7DD-4DF8-8575-3B92DE16C99B}" type="slidenum">
+              <a:rPr lang="en-SG" smtClean="0"/>
+              <a:t>7</a:t>
             </a:fld>
             <a:endParaRPr lang="en-SG"/>
           </a:p>
@@ -960,7 +1386,7 @@
           <a:p>
             <a:fld id="{D5245D7B-ED48-4D86-BCCB-2CB84AF08DCA}" type="datetimeFigureOut">
               <a:rPr lang="en-SG" smtClean="0"/>
-              <a:t>30/10/2018</a:t>
+              <a:t>31/10/2018</a:t>
             </a:fld>
             <a:endParaRPr lang="en-SG"/>
           </a:p>
@@ -1160,7 +1586,7 @@
           <a:p>
             <a:fld id="{D5245D7B-ED48-4D86-BCCB-2CB84AF08DCA}" type="datetimeFigureOut">
               <a:rPr lang="en-SG" smtClean="0"/>
-              <a:t>30/10/2018</a:t>
+              <a:t>31/10/2018</a:t>
             </a:fld>
             <a:endParaRPr lang="en-SG"/>
           </a:p>
@@ -1370,7 +1796,7 @@
           <a:p>
             <a:fld id="{D5245D7B-ED48-4D86-BCCB-2CB84AF08DCA}" type="datetimeFigureOut">
               <a:rPr lang="en-SG" smtClean="0"/>
-              <a:t>30/10/2018</a:t>
+              <a:t>31/10/2018</a:t>
             </a:fld>
             <a:endParaRPr lang="en-SG"/>
           </a:p>
@@ -1570,7 +1996,7 @@
           <a:p>
             <a:fld id="{D5245D7B-ED48-4D86-BCCB-2CB84AF08DCA}" type="datetimeFigureOut">
               <a:rPr lang="en-SG" smtClean="0"/>
-              <a:t>30/10/2018</a:t>
+              <a:t>31/10/2018</a:t>
             </a:fld>
             <a:endParaRPr lang="en-SG"/>
           </a:p>
@@ -1846,7 +2272,7 @@
           <a:p>
             <a:fld id="{D5245D7B-ED48-4D86-BCCB-2CB84AF08DCA}" type="datetimeFigureOut">
               <a:rPr lang="en-SG" smtClean="0"/>
-              <a:t>30/10/2018</a:t>
+              <a:t>31/10/2018</a:t>
             </a:fld>
             <a:endParaRPr lang="en-SG"/>
           </a:p>
@@ -2114,7 +2540,7 @@
           <a:p>
             <a:fld id="{D5245D7B-ED48-4D86-BCCB-2CB84AF08DCA}" type="datetimeFigureOut">
               <a:rPr lang="en-SG" smtClean="0"/>
-              <a:t>30/10/2018</a:t>
+              <a:t>31/10/2018</a:t>
             </a:fld>
             <a:endParaRPr lang="en-SG"/>
           </a:p>
@@ -2529,7 +2955,7 @@
           <a:p>
             <a:fld id="{D5245D7B-ED48-4D86-BCCB-2CB84AF08DCA}" type="datetimeFigureOut">
               <a:rPr lang="en-SG" smtClean="0"/>
-              <a:t>30/10/2018</a:t>
+              <a:t>31/10/2018</a:t>
             </a:fld>
             <a:endParaRPr lang="en-SG"/>
           </a:p>
@@ -2671,7 +3097,7 @@
           <a:p>
             <a:fld id="{D5245D7B-ED48-4D86-BCCB-2CB84AF08DCA}" type="datetimeFigureOut">
               <a:rPr lang="en-SG" smtClean="0"/>
-              <a:t>30/10/2018</a:t>
+              <a:t>31/10/2018</a:t>
             </a:fld>
             <a:endParaRPr lang="en-SG"/>
           </a:p>
@@ -2784,7 +3210,7 @@
           <a:p>
             <a:fld id="{D5245D7B-ED48-4D86-BCCB-2CB84AF08DCA}" type="datetimeFigureOut">
               <a:rPr lang="en-SG" smtClean="0"/>
-              <a:t>30/10/2018</a:t>
+              <a:t>31/10/2018</a:t>
             </a:fld>
             <a:endParaRPr lang="en-SG"/>
           </a:p>
@@ -3097,7 +3523,7 @@
           <a:p>
             <a:fld id="{D5245D7B-ED48-4D86-BCCB-2CB84AF08DCA}" type="datetimeFigureOut">
               <a:rPr lang="en-SG" smtClean="0"/>
-              <a:t>30/10/2018</a:t>
+              <a:t>31/10/2018</a:t>
             </a:fld>
             <a:endParaRPr lang="en-SG"/>
           </a:p>
@@ -3386,7 +3812,7 @@
           <a:p>
             <a:fld id="{D5245D7B-ED48-4D86-BCCB-2CB84AF08DCA}" type="datetimeFigureOut">
               <a:rPr lang="en-SG" smtClean="0"/>
-              <a:t>30/10/2018</a:t>
+              <a:t>31/10/2018</a:t>
             </a:fld>
             <a:endParaRPr lang="en-SG"/>
           </a:p>
@@ -3629,7 +4055,7 @@
           <a:p>
             <a:fld id="{D5245D7B-ED48-4D86-BCCB-2CB84AF08DCA}" type="datetimeFigureOut">
               <a:rPr lang="en-SG" smtClean="0"/>
-              <a:t>30/10/2018</a:t>
+              <a:t>31/10/2018</a:t>
             </a:fld>
             <a:endParaRPr lang="en-SG"/>
           </a:p>
@@ -4048,6 +4474,394 @@
       </p:grpSpPr>
       <p:pic>
         <p:nvPicPr>
+          <p:cNvPr id="10" name="Picture 9">
+            <a:extLst>
+              <a:ext uri="{FF2B5EF4-FFF2-40B4-BE49-F238E27FC236}">
+                <a16:creationId xmlns:a16="http://schemas.microsoft.com/office/drawing/2014/main" id="{079454F4-3FD5-4354-AEB2-9ECEDAACA1E1}"/>
+              </a:ext>
+            </a:extLst>
+          </p:cNvPr>
+          <p:cNvPicPr>
+            <a:picLocks noChangeAspect="1"/>
+          </p:cNvPicPr>
+          <p:nvPr/>
+        </p:nvPicPr>
+        <p:blipFill>
+          <a:blip r:embed="rId3"/>
+          <a:stretch>
+            <a:fillRect/>
+          </a:stretch>
+        </p:blipFill>
+        <p:spPr>
+          <a:xfrm>
+            <a:off x="4190010" y="0"/>
+            <a:ext cx="3811979" cy="6863617"/>
+          </a:xfrm>
+          <a:prstGeom prst="rect">
+            <a:avLst/>
+          </a:prstGeom>
+        </p:spPr>
+      </p:pic>
+      <p:sp>
+        <p:nvSpPr>
+          <p:cNvPr id="7" name="Oval 6">
+            <a:extLst>
+              <a:ext uri="{FF2B5EF4-FFF2-40B4-BE49-F238E27FC236}">
+                <a16:creationId xmlns:a16="http://schemas.microsoft.com/office/drawing/2014/main" id="{46F24007-1D4E-4E05-9D84-D29B2B74BCB7}"/>
+              </a:ext>
+            </a:extLst>
+          </p:cNvPr>
+          <p:cNvSpPr/>
+          <p:nvPr/>
+        </p:nvSpPr>
+        <p:spPr>
+          <a:xfrm>
+            <a:off x="4350329" y="698047"/>
+            <a:ext cx="342900" cy="323850"/>
+          </a:xfrm>
+          <a:prstGeom prst="ellipse">
+            <a:avLst/>
+          </a:prstGeom>
+          <a:noFill/>
+          <a:ln w="38100">
+            <a:solidFill>
+              <a:srgbClr val="FF0000"/>
+            </a:solidFill>
+          </a:ln>
+        </p:spPr>
+        <p:style>
+          <a:lnRef idx="2">
+            <a:schemeClr val="accent1">
+              <a:shade val="50000"/>
+            </a:schemeClr>
+          </a:lnRef>
+          <a:fillRef idx="1">
+            <a:schemeClr val="accent1"/>
+          </a:fillRef>
+          <a:effectRef idx="0">
+            <a:schemeClr val="accent1"/>
+          </a:effectRef>
+          <a:fontRef idx="minor">
+            <a:schemeClr val="lt1"/>
+          </a:fontRef>
+        </p:style>
+        <p:txBody>
+          <a:bodyPr rtlCol="0" anchor="ctr"/>
+          <a:lstStyle/>
+          <a:p>
+            <a:pPr algn="ctr"/>
+            <a:endParaRPr lang="en-SG"/>
+          </a:p>
+        </p:txBody>
+      </p:sp>
+      <p:sp>
+        <p:nvSpPr>
+          <p:cNvPr id="8" name="Oval 7">
+            <a:extLst>
+              <a:ext uri="{FF2B5EF4-FFF2-40B4-BE49-F238E27FC236}">
+                <a16:creationId xmlns:a16="http://schemas.microsoft.com/office/drawing/2014/main" id="{320E809B-7E38-440E-9F0F-605C0930FDAA}"/>
+              </a:ext>
+            </a:extLst>
+          </p:cNvPr>
+          <p:cNvSpPr/>
+          <p:nvPr/>
+        </p:nvSpPr>
+        <p:spPr>
+          <a:xfrm>
+            <a:off x="4350329" y="2154283"/>
+            <a:ext cx="342900" cy="323850"/>
+          </a:xfrm>
+          <a:prstGeom prst="ellipse">
+            <a:avLst/>
+          </a:prstGeom>
+          <a:noFill/>
+          <a:ln w="38100">
+            <a:solidFill>
+              <a:srgbClr val="FF0000"/>
+            </a:solidFill>
+          </a:ln>
+        </p:spPr>
+        <p:style>
+          <a:lnRef idx="2">
+            <a:schemeClr val="accent1">
+              <a:shade val="50000"/>
+            </a:schemeClr>
+          </a:lnRef>
+          <a:fillRef idx="1">
+            <a:schemeClr val="accent1"/>
+          </a:fillRef>
+          <a:effectRef idx="0">
+            <a:schemeClr val="accent1"/>
+          </a:effectRef>
+          <a:fontRef idx="minor">
+            <a:schemeClr val="lt1"/>
+          </a:fontRef>
+        </p:style>
+        <p:txBody>
+          <a:bodyPr rtlCol="0" anchor="ctr"/>
+          <a:lstStyle/>
+          <a:p>
+            <a:pPr algn="ctr"/>
+            <a:endParaRPr lang="en-SG"/>
+          </a:p>
+        </p:txBody>
+      </p:sp>
+      <p:sp>
+        <p:nvSpPr>
+          <p:cNvPr id="9" name="Oval 8">
+            <a:extLst>
+              <a:ext uri="{FF2B5EF4-FFF2-40B4-BE49-F238E27FC236}">
+                <a16:creationId xmlns:a16="http://schemas.microsoft.com/office/drawing/2014/main" id="{89321DC0-77E1-4048-855A-7C0AF81D5109}"/>
+              </a:ext>
+            </a:extLst>
+          </p:cNvPr>
+          <p:cNvSpPr/>
+          <p:nvPr/>
+        </p:nvSpPr>
+        <p:spPr>
+          <a:xfrm>
+            <a:off x="4338454" y="3610519"/>
+            <a:ext cx="342900" cy="323850"/>
+          </a:xfrm>
+          <a:prstGeom prst="ellipse">
+            <a:avLst/>
+          </a:prstGeom>
+          <a:noFill/>
+          <a:ln w="38100">
+            <a:solidFill>
+              <a:srgbClr val="FF0000"/>
+            </a:solidFill>
+          </a:ln>
+        </p:spPr>
+        <p:style>
+          <a:lnRef idx="2">
+            <a:schemeClr val="accent1">
+              <a:shade val="50000"/>
+            </a:schemeClr>
+          </a:lnRef>
+          <a:fillRef idx="1">
+            <a:schemeClr val="accent1"/>
+          </a:fillRef>
+          <a:effectRef idx="0">
+            <a:schemeClr val="accent1"/>
+          </a:effectRef>
+          <a:fontRef idx="minor">
+            <a:schemeClr val="lt1"/>
+          </a:fontRef>
+        </p:style>
+        <p:txBody>
+          <a:bodyPr rtlCol="0" anchor="ctr"/>
+          <a:lstStyle/>
+          <a:p>
+            <a:pPr algn="ctr"/>
+            <a:endParaRPr lang="en-SG"/>
+          </a:p>
+        </p:txBody>
+      </p:sp>
+    </p:spTree>
+    <p:extLst>
+      <p:ext uri="{BB962C8B-B14F-4D97-AF65-F5344CB8AC3E}">
+        <p14:creationId xmlns:p14="http://schemas.microsoft.com/office/powerpoint/2010/main" val="4188519581"/>
+      </p:ext>
+    </p:extLst>
+  </p:cSld>
+  <p:clrMapOvr>
+    <a:masterClrMapping/>
+  </p:clrMapOvr>
+</p:sld>
+</file>
+
+<file path=ppt/slides/slide2.xml><?xml version="1.0" encoding="utf-8"?>
+<p:sld xmlns:a="http://schemas.openxmlformats.org/drawingml/2006/main" xmlns:r="http://schemas.openxmlformats.org/officeDocument/2006/relationships" xmlns:p="http://schemas.openxmlformats.org/presentationml/2006/main">
+  <p:cSld>
+    <p:spTree>
+      <p:nvGrpSpPr>
+        <p:cNvPr id="1" name=""/>
+        <p:cNvGrpSpPr/>
+        <p:nvPr/>
+      </p:nvGrpSpPr>
+      <p:grpSpPr>
+        <a:xfrm>
+          <a:off x="0" y="0"/>
+          <a:ext cx="0" cy="0"/>
+          <a:chOff x="0" y="0"/>
+          <a:chExt cx="0" cy="0"/>
+        </a:xfrm>
+      </p:grpSpPr>
+      <p:pic>
+        <p:nvPicPr>
+          <p:cNvPr id="5" name="Picture 4">
+            <a:extLst>
+              <a:ext uri="{FF2B5EF4-FFF2-40B4-BE49-F238E27FC236}">
+                <a16:creationId xmlns:a16="http://schemas.microsoft.com/office/drawing/2014/main" id="{8A6C0D27-A076-40A2-B112-360546C7DDB0}"/>
+              </a:ext>
+            </a:extLst>
+          </p:cNvPr>
+          <p:cNvPicPr>
+            <a:picLocks noChangeAspect="1"/>
+          </p:cNvPicPr>
+          <p:nvPr/>
+        </p:nvPicPr>
+        <p:blipFill>
+          <a:blip r:embed="rId3"/>
+          <a:stretch>
+            <a:fillRect/>
+          </a:stretch>
+        </p:blipFill>
+        <p:spPr>
+          <a:xfrm>
+            <a:off x="4190010" y="-5617"/>
+            <a:ext cx="3811979" cy="6863617"/>
+          </a:xfrm>
+          <a:prstGeom prst="rect">
+            <a:avLst/>
+          </a:prstGeom>
+        </p:spPr>
+      </p:pic>
+    </p:spTree>
+    <p:extLst>
+      <p:ext uri="{BB962C8B-B14F-4D97-AF65-F5344CB8AC3E}">
+        <p14:creationId xmlns:p14="http://schemas.microsoft.com/office/powerpoint/2010/main" val="1198764428"/>
+      </p:ext>
+    </p:extLst>
+  </p:cSld>
+  <p:clrMapOvr>
+    <a:masterClrMapping/>
+  </p:clrMapOvr>
+</p:sld>
+</file>
+
+<file path=ppt/slides/slide3.xml><?xml version="1.0" encoding="utf-8"?>
+<p:sld xmlns:a="http://schemas.openxmlformats.org/drawingml/2006/main" xmlns:r="http://schemas.openxmlformats.org/officeDocument/2006/relationships" xmlns:p="http://schemas.openxmlformats.org/presentationml/2006/main">
+  <p:cSld>
+    <p:spTree>
+      <p:nvGrpSpPr>
+        <p:cNvPr id="1" name=""/>
+        <p:cNvGrpSpPr/>
+        <p:nvPr/>
+      </p:nvGrpSpPr>
+      <p:grpSpPr>
+        <a:xfrm>
+          <a:off x="0" y="0"/>
+          <a:ext cx="0" cy="0"/>
+          <a:chOff x="0" y="0"/>
+          <a:chExt cx="0" cy="0"/>
+        </a:xfrm>
+      </p:grpSpPr>
+      <p:pic>
+        <p:nvPicPr>
+          <p:cNvPr id="6" name="Picture 5">
+            <a:extLst>
+              <a:ext uri="{FF2B5EF4-FFF2-40B4-BE49-F238E27FC236}">
+                <a16:creationId xmlns:a16="http://schemas.microsoft.com/office/drawing/2014/main" id="{36719709-B20A-4F79-BA72-7E9C46854DB9}"/>
+              </a:ext>
+            </a:extLst>
+          </p:cNvPr>
+          <p:cNvPicPr>
+            <a:picLocks noChangeAspect="1"/>
+          </p:cNvPicPr>
+          <p:nvPr/>
+        </p:nvPicPr>
+        <p:blipFill>
+          <a:blip r:embed="rId3"/>
+          <a:stretch>
+            <a:fillRect/>
+          </a:stretch>
+        </p:blipFill>
+        <p:spPr>
+          <a:xfrm>
+            <a:off x="4191570" y="0"/>
+            <a:ext cx="3808859" cy="6858000"/>
+          </a:xfrm>
+          <a:prstGeom prst="rect">
+            <a:avLst/>
+          </a:prstGeom>
+        </p:spPr>
+      </p:pic>
+      <p:sp>
+        <p:nvSpPr>
+          <p:cNvPr id="7" name="Rectangle 6">
+            <a:extLst>
+              <a:ext uri="{FF2B5EF4-FFF2-40B4-BE49-F238E27FC236}">
+                <a16:creationId xmlns:a16="http://schemas.microsoft.com/office/drawing/2014/main" id="{AB353266-0C93-4569-9762-EAC41DE861FE}"/>
+              </a:ext>
+            </a:extLst>
+          </p:cNvPr>
+          <p:cNvSpPr/>
+          <p:nvPr/>
+        </p:nvSpPr>
+        <p:spPr>
+          <a:xfrm>
+            <a:off x="4191570" y="4945578"/>
+            <a:ext cx="3808859" cy="1476375"/>
+          </a:xfrm>
+          <a:prstGeom prst="rect">
+            <a:avLst/>
+          </a:prstGeom>
+          <a:noFill/>
+          <a:ln w="38100">
+            <a:solidFill>
+              <a:srgbClr val="FF0000"/>
+            </a:solidFill>
+          </a:ln>
+        </p:spPr>
+        <p:style>
+          <a:lnRef idx="2">
+            <a:schemeClr val="accent1">
+              <a:shade val="50000"/>
+            </a:schemeClr>
+          </a:lnRef>
+          <a:fillRef idx="1">
+            <a:schemeClr val="accent1"/>
+          </a:fillRef>
+          <a:effectRef idx="0">
+            <a:schemeClr val="accent1"/>
+          </a:effectRef>
+          <a:fontRef idx="minor">
+            <a:schemeClr val="lt1"/>
+          </a:fontRef>
+        </p:style>
+        <p:txBody>
+          <a:bodyPr rtlCol="0" anchor="ctr"/>
+          <a:lstStyle/>
+          <a:p>
+            <a:pPr algn="ctr"/>
+            <a:endParaRPr lang="en-SG"/>
+          </a:p>
+        </p:txBody>
+      </p:sp>
+    </p:spTree>
+    <p:extLst>
+      <p:ext uri="{BB962C8B-B14F-4D97-AF65-F5344CB8AC3E}">
+        <p14:creationId xmlns:p14="http://schemas.microsoft.com/office/powerpoint/2010/main" val="1658843613"/>
+      </p:ext>
+    </p:extLst>
+  </p:cSld>
+  <p:clrMapOvr>
+    <a:masterClrMapping/>
+  </p:clrMapOvr>
+</p:sld>
+</file>
+
+<file path=ppt/slides/slide4.xml><?xml version="1.0" encoding="utf-8"?>
+<p:sld xmlns:a="http://schemas.openxmlformats.org/drawingml/2006/main" xmlns:r="http://schemas.openxmlformats.org/officeDocument/2006/relationships" xmlns:p="http://schemas.openxmlformats.org/presentationml/2006/main">
+  <p:cSld>
+    <p:spTree>
+      <p:nvGrpSpPr>
+        <p:cNvPr id="1" name=""/>
+        <p:cNvGrpSpPr/>
+        <p:nvPr/>
+      </p:nvGrpSpPr>
+      <p:grpSpPr>
+        <a:xfrm>
+          <a:off x="0" y="0"/>
+          <a:ext cx="0" cy="0"/>
+          <a:chOff x="0" y="0"/>
+          <a:chExt cx="0" cy="0"/>
+        </a:xfrm>
+      </p:grpSpPr>
+      <p:pic>
+        <p:nvPicPr>
           <p:cNvPr id="4" name="Picture 3">
             <a:extLst>
               <a:ext uri="{FF2B5EF4-FFF2-40B4-BE49-F238E27FC236}">
@@ -4141,7 +4955,7 @@
 </p:sld>
 </file>
 
-<file path=ppt/slides/slide2.xml><?xml version="1.0" encoding="utf-8"?>
+<file path=ppt/slides/slide5.xml><?xml version="1.0" encoding="utf-8"?>
 <p:sld xmlns:a="http://schemas.openxmlformats.org/drawingml/2006/main" xmlns:r="http://schemas.openxmlformats.org/officeDocument/2006/relationships" xmlns:p="http://schemas.openxmlformats.org/presentationml/2006/main">
   <p:cSld>
     <p:spTree>
@@ -4253,7 +5067,7 @@
 </p:sld>
 </file>
 
-<file path=ppt/slides/slide3.xml><?xml version="1.0" encoding="utf-8"?>
+<file path=ppt/slides/slide6.xml><?xml version="1.0" encoding="utf-8"?>
 <p:sld xmlns:a="http://schemas.openxmlformats.org/drawingml/2006/main" xmlns:r="http://schemas.openxmlformats.org/officeDocument/2006/relationships" xmlns:p="http://schemas.openxmlformats.org/presentationml/2006/main">
   <p:cSld>
     <p:spTree>
@@ -4371,7 +5185,7 @@
 </p:sld>
 </file>
 
-<file path=ppt/slides/slide4.xml><?xml version="1.0" encoding="utf-8"?>
+<file path=ppt/slides/slide7.xml><?xml version="1.0" encoding="utf-8"?>
 <p:sld xmlns:a="http://schemas.openxmlformats.org/drawingml/2006/main" xmlns:r="http://schemas.openxmlformats.org/officeDocument/2006/relationships" xmlns:p="http://schemas.openxmlformats.org/presentationml/2006/main">
   <p:cSld>
     <p:spTree>

</xml_diff>

<commit_message>
Update images in Command_Event.pptx
</commit_message>
<xml_diff>
--- a/docs/diagrams/Command_Event.pptx
+++ b/docs/diagrams/Command_Event.pptx
@@ -5,16 +5,14 @@
     <p:sldMasterId id="2147483648" r:id="rId1"/>
   </p:sldMasterIdLst>
   <p:notesMasterIdLst>
-    <p:notesMasterId r:id="rId9"/>
+    <p:notesMasterId r:id="rId7"/>
   </p:notesMasterIdLst>
   <p:sldIdLst>
-    <p:sldId id="260" r:id="rId2"/>
-    <p:sldId id="261" r:id="rId3"/>
-    <p:sldId id="262" r:id="rId4"/>
-    <p:sldId id="257" r:id="rId5"/>
-    <p:sldId id="258" r:id="rId6"/>
-    <p:sldId id="256" r:id="rId7"/>
-    <p:sldId id="259" r:id="rId8"/>
+    <p:sldId id="261" r:id="rId2"/>
+    <p:sldId id="262" r:id="rId3"/>
+    <p:sldId id="260" r:id="rId4"/>
+    <p:sldId id="263" r:id="rId5"/>
+    <p:sldId id="264" r:id="rId6"/>
   </p:sldIdLst>
   <p:sldSz cx="12192000" cy="6858000"/>
   <p:notesSz cx="6858000" cy="9144000"/>
@@ -203,7 +201,7 @@
           <a:p>
             <a:fld id="{88FCF8A4-4925-4635-B32F-EA7CEC81441A}" type="datetimeFigureOut">
               <a:rPr lang="en-SG" smtClean="0"/>
-              <a:t>31/10/2018</a:t>
+              <a:t>2/11/2018</a:t>
             </a:fld>
             <a:endParaRPr lang="en-SG"/>
           </a:p>
@@ -516,20 +514,41 @@
           <a:lstStyle/>
           <a:p>
             <a:r>
-              <a:rPr lang="en-US" dirty="0"/>
-              <a:t>Add event – Event Index</a:t>
-            </a:r>
-          </a:p>
-          <a:p>
+              <a:rPr lang="en-GB" dirty="0"/>
+              <a:t>Effect of add command</a:t>
+            </a:r>
+          </a:p>
+          <a:p>
+            <a:r>
+              <a:rPr lang="en-GB" dirty="0"/>
+              <a:t>add n/Flag Day l/Yishun MRT </a:t>
+            </a:r>
+            <a:r>
+              <a:rPr lang="en-GB" dirty="0" err="1"/>
+              <a:t>sd</a:t>
+            </a:r>
+            <a:r>
+              <a:rPr lang="en-GB" dirty="0"/>
+              <a:t>/31-10-2018 </a:t>
+            </a:r>
+            <a:r>
+              <a:rPr lang="en-GB" dirty="0" err="1"/>
+              <a:t>ed</a:t>
+            </a:r>
+            <a:r>
+              <a:rPr lang="en-GB" dirty="0"/>
+              <a:t>/31-10-2018 </a:t>
+            </a:r>
+            <a:r>
+              <a:rPr lang="en-GB" dirty="0" err="1"/>
+              <a:t>st</a:t>
+            </a:r>
+            <a:r>
+              <a:rPr lang="en-GB" dirty="0"/>
+              <a:t>/09:00 et/15:00 d/For the children’s home</a:t>
+            </a:r>
             <a:endParaRPr lang="en-US" dirty="0"/>
           </a:p>
-          <a:p>
-            <a:r>
-              <a:rPr lang="en-US" dirty="0"/>
-              <a:t>C: The EVENT_INDEX</a:t>
-            </a:r>
-            <a:endParaRPr lang="en-SG" dirty="0"/>
-          </a:p>
         </p:txBody>
       </p:sp>
       <p:sp>
@@ -539,7 +558,7 @@
             <a:spLocks noGrp="1"/>
           </p:cNvSpPr>
           <p:nvPr>
-            <p:ph type="sldNum" sz="quarter" idx="5"/>
+            <p:ph type="sldNum" sz="quarter" idx="10"/>
           </p:nvPr>
         </p:nvSpPr>
         <p:spPr/>
@@ -558,7 +577,7 @@
     </p:spTree>
     <p:extLst>
       <p:ext uri="{BB962C8B-B14F-4D97-AF65-F5344CB8AC3E}">
-        <p14:creationId xmlns:p14="http://schemas.microsoft.com/office/powerpoint/2010/main" val="3726095554"/>
+        <p14:creationId xmlns:p14="http://schemas.microsoft.com/office/powerpoint/2010/main" val="4157101339"/>
       </p:ext>
     </p:extLst>
   </p:cSld>
@@ -613,16 +632,40 @@
           <a:lstStyle/>
           <a:p>
             <a:r>
-              <a:rPr lang="en-US" dirty="0"/>
-              <a:t>Example: </a:t>
-            </a:r>
-          </a:p>
-          <a:p>
-            <a:r>
-              <a:rPr lang="en-US" dirty="0"/>
-              <a:t>C: Before adding an event</a:t>
-            </a:r>
-            <a:endParaRPr lang="en-SG" dirty="0"/>
+              <a:rPr lang="en-GB" dirty="0"/>
+              <a:t>Effect of add command</a:t>
+            </a:r>
+          </a:p>
+          <a:p>
+            <a:r>
+              <a:rPr lang="en-GB" dirty="0"/>
+              <a:t>add n/Fundraising l/Tampines Street 31 </a:t>
+            </a:r>
+            <a:r>
+              <a:rPr lang="en-GB" dirty="0" err="1"/>
+              <a:t>sd</a:t>
+            </a:r>
+            <a:r>
+              <a:rPr lang="en-GB" dirty="0"/>
+              <a:t>/15-11-2018 </a:t>
+            </a:r>
+            <a:r>
+              <a:rPr lang="en-GB" dirty="0" err="1"/>
+              <a:t>ed</a:t>
+            </a:r>
+            <a:r>
+              <a:rPr lang="en-GB" dirty="0"/>
+              <a:t>/17-11-2018 </a:t>
+            </a:r>
+            <a:r>
+              <a:rPr lang="en-GB" dirty="0" err="1"/>
+              <a:t>st</a:t>
+            </a:r>
+            <a:r>
+              <a:rPr lang="en-GB" dirty="0"/>
+              <a:t>/13:00 et/18:00 d/Raising funds t/fundraiser t/charity</a:t>
+            </a:r>
+            <a:endParaRPr lang="en-US" dirty="0"/>
           </a:p>
         </p:txBody>
       </p:sp>
@@ -633,7 +676,7 @@
             <a:spLocks noGrp="1"/>
           </p:cNvSpPr>
           <p:nvPr>
-            <p:ph type="sldNum" sz="quarter" idx="5"/>
+            <p:ph type="sldNum" sz="quarter" idx="10"/>
           </p:nvPr>
         </p:nvSpPr>
         <p:spPr/>
@@ -652,7 +695,7 @@
     </p:spTree>
     <p:extLst>
       <p:ext uri="{BB962C8B-B14F-4D97-AF65-F5344CB8AC3E}">
-        <p14:creationId xmlns:p14="http://schemas.microsoft.com/office/powerpoint/2010/main" val="1736216025"/>
+        <p14:creationId xmlns:p14="http://schemas.microsoft.com/office/powerpoint/2010/main" val="2000553253"/>
       </p:ext>
     </p:extLst>
   </p:cSld>
@@ -706,150 +749,10 @@
           <a:bodyPr/>
           <a:lstStyle/>
           <a:p>
-            <a:pPr marL="0" marR="0" lvl="0" indent="0" algn="l" defTabSz="914400" rtl="0" eaLnBrk="1" fontAlgn="auto" latinLnBrk="0" hangingPunct="1">
-              <a:lnSpc>
-                <a:spcPct val="100000"/>
-              </a:lnSpc>
-              <a:spcBef>
-                <a:spcPts val="0"/>
-              </a:spcBef>
-              <a:spcAft>
-                <a:spcPts val="0"/>
-              </a:spcAft>
-              <a:buClrTx/>
-              <a:buSzTx/>
-              <a:buFontTx/>
-              <a:buNone/>
-              <a:tabLst/>
-              <a:defRPr/>
-            </a:pPr>
             <a:r>
               <a:rPr lang="en-US" dirty="0"/>
-              <a:t>C: Output of `</a:t>
-            </a:r>
-            <a:r>
-              <a:rPr lang="en-SG" dirty="0"/>
-              <a:t>add n/Flag Day 2018 l/</a:t>
-            </a:r>
-            <a:r>
-              <a:rPr lang="fr-FR" dirty="0" err="1"/>
-              <a:t>Tampines</a:t>
-            </a:r>
-            <a:r>
-              <a:rPr lang="fr-FR" dirty="0"/>
-              <a:t> MRT Station (EW2), 20 </a:t>
-            </a:r>
-            <a:r>
-              <a:rPr lang="fr-FR" dirty="0" err="1"/>
-              <a:t>Tampines</a:t>
-            </a:r>
-            <a:r>
-              <a:rPr lang="fr-FR" dirty="0"/>
-              <a:t> Central 1 529538</a:t>
-            </a:r>
-            <a:r>
-              <a:rPr lang="en-SG" dirty="0"/>
-              <a:t> </a:t>
-            </a:r>
-            <a:r>
-              <a:rPr lang="en-SG" dirty="0" err="1"/>
-              <a:t>sd</a:t>
-            </a:r>
-            <a:r>
-              <a:rPr lang="en-SG" dirty="0"/>
-              <a:t>/05-12-2018 ed/05-12-2018 </a:t>
-            </a:r>
-            <a:r>
-              <a:rPr lang="en-SG" dirty="0" err="1"/>
-              <a:t>st</a:t>
-            </a:r>
-            <a:r>
-              <a:rPr lang="en-SG" dirty="0"/>
-              <a:t>/09:00 et/17:00 d/Raising funds and spreading awareness for a cause. t/Fundraising`</a:t>
-            </a:r>
-            <a:endParaRPr lang="en-US" dirty="0"/>
-          </a:p>
-          <a:p>
-            <a:pPr marL="0" marR="0" lvl="0" indent="0" algn="l" defTabSz="914400" rtl="0" eaLnBrk="1" fontAlgn="auto" latinLnBrk="0" hangingPunct="1">
-              <a:lnSpc>
-                <a:spcPct val="100000"/>
-              </a:lnSpc>
-              <a:spcBef>
-                <a:spcPts val="0"/>
-              </a:spcBef>
-              <a:spcAft>
-                <a:spcPts val="0"/>
-              </a:spcAft>
-              <a:buClrTx/>
-              <a:buSzTx/>
-              <a:buFontTx/>
-              <a:buNone/>
-              <a:tabLst/>
-              <a:defRPr/>
-            </a:pPr>
-            <a:endParaRPr lang="en-SG" dirty="0"/>
-          </a:p>
-          <a:p>
-            <a:pPr marL="0" marR="0" lvl="0" indent="0" algn="l" defTabSz="914400" rtl="0" eaLnBrk="1" fontAlgn="auto" latinLnBrk="0" hangingPunct="1">
-              <a:lnSpc>
-                <a:spcPct val="100000"/>
-              </a:lnSpc>
-              <a:spcBef>
-                <a:spcPts val="0"/>
-              </a:spcBef>
-              <a:spcAft>
-                <a:spcPts val="0"/>
-              </a:spcAft>
-              <a:buClrTx/>
-              <a:buSzTx/>
-              <a:buFontTx/>
-              <a:buNone/>
-              <a:tabLst/>
-              <a:defRPr/>
-            </a:pPr>
-            <a:r>
-              <a:rPr lang="en-SG" dirty="0"/>
-              <a:t>add n/Flag Day 2018 l/</a:t>
-            </a:r>
-            <a:r>
-              <a:rPr lang="fr-FR" dirty="0" err="1"/>
-              <a:t>Tampines</a:t>
-            </a:r>
-            <a:r>
-              <a:rPr lang="fr-FR" dirty="0"/>
-              <a:t> MRT Station (EW2), 20 </a:t>
-            </a:r>
-            <a:r>
-              <a:rPr lang="fr-FR" dirty="0" err="1"/>
-              <a:t>Tampines</a:t>
-            </a:r>
-            <a:r>
-              <a:rPr lang="fr-FR" dirty="0"/>
-              <a:t> Central 1 529538</a:t>
-            </a:r>
-            <a:r>
-              <a:rPr lang="en-SG" dirty="0"/>
-              <a:t> </a:t>
-            </a:r>
-            <a:r>
-              <a:rPr lang="en-SG" dirty="0" err="1"/>
-              <a:t>sd</a:t>
-            </a:r>
-            <a:r>
-              <a:rPr lang="en-SG" dirty="0"/>
-              <a:t>/05-12-2018 ed/05-12-2018 </a:t>
-            </a:r>
-            <a:r>
-              <a:rPr lang="en-SG" dirty="0" err="1"/>
-              <a:t>st</a:t>
-            </a:r>
-            <a:r>
-              <a:rPr lang="en-SG" dirty="0"/>
-              <a:t>/09:00 et/17:00 d/Raising funds and spreading awareness for a cause. t/Fundraising</a:t>
-            </a:r>
-          </a:p>
-          <a:p>
-            <a:endParaRPr lang="en-SG" dirty="0"/>
+              <a:t>EVENT_INDEX</a:t>
+            </a:r>
           </a:p>
         </p:txBody>
       </p:sp>
@@ -860,7 +763,7 @@
             <a:spLocks noGrp="1"/>
           </p:cNvSpPr>
           <p:nvPr>
-            <p:ph type="sldNum" sz="quarter" idx="5"/>
+            <p:ph type="sldNum" sz="quarter" idx="10"/>
           </p:nvPr>
         </p:nvSpPr>
         <p:spPr/>
@@ -879,7 +782,7 @@
     </p:spTree>
     <p:extLst>
       <p:ext uri="{BB962C8B-B14F-4D97-AF65-F5344CB8AC3E}">
-        <p14:creationId xmlns:p14="http://schemas.microsoft.com/office/powerpoint/2010/main" val="813284006"/>
+        <p14:creationId xmlns:p14="http://schemas.microsoft.com/office/powerpoint/2010/main" val="990324362"/>
       </p:ext>
     </p:extLst>
   </p:cSld>
@@ -934,9 +837,16 @@
           <a:lstStyle/>
           <a:p>
             <a:r>
-              <a:rPr lang="en-SG" dirty="0"/>
-              <a:t>Add event- after1</a:t>
-            </a:r>
+              <a:rPr lang="en-US" dirty="0"/>
+              <a:t>Effect of edit command</a:t>
+            </a:r>
+          </a:p>
+          <a:p>
+            <a:r>
+              <a:rPr lang="en-GB" dirty="0"/>
+              <a:t>edit 1 n/Charity Fun Run t/</a:t>
+            </a:r>
+            <a:endParaRPr lang="en-US" dirty="0"/>
           </a:p>
         </p:txBody>
       </p:sp>
@@ -947,7 +857,7 @@
             <a:spLocks noGrp="1"/>
           </p:cNvSpPr>
           <p:nvPr>
-            <p:ph type="sldNum" sz="quarter" idx="5"/>
+            <p:ph type="sldNum" sz="quarter" idx="10"/>
           </p:nvPr>
         </p:nvSpPr>
         <p:spPr/>
@@ -966,7 +876,7 @@
     </p:spTree>
     <p:extLst>
       <p:ext uri="{BB962C8B-B14F-4D97-AF65-F5344CB8AC3E}">
-        <p14:creationId xmlns:p14="http://schemas.microsoft.com/office/powerpoint/2010/main" val="3390705064"/>
+        <p14:creationId xmlns:p14="http://schemas.microsoft.com/office/powerpoint/2010/main" val="1248699296"/>
       </p:ext>
     </p:extLst>
   </p:cSld>
@@ -1021,9 +931,16 @@
           <a:lstStyle/>
           <a:p>
             <a:r>
-              <a:rPr lang="en-SG" dirty="0"/>
-              <a:t>Add event- after2</a:t>
-            </a:r>
+              <a:rPr lang="en-US" dirty="0"/>
+              <a:t>Effect of delete command</a:t>
+            </a:r>
+          </a:p>
+          <a:p>
+            <a:r>
+              <a:rPr lang="en-US" dirty="0"/>
+              <a:t>delete 3</a:t>
+            </a:r>
+            <a:endParaRPr lang="en-SG" dirty="0"/>
           </a:p>
         </p:txBody>
       </p:sp>
@@ -1053,181 +970,7 @@
     </p:spTree>
     <p:extLst>
       <p:ext uri="{BB962C8B-B14F-4D97-AF65-F5344CB8AC3E}">
-        <p14:creationId xmlns:p14="http://schemas.microsoft.com/office/powerpoint/2010/main" val="2124717986"/>
-      </p:ext>
-    </p:extLst>
-  </p:cSld>
-  <p:clrMapOvr>
-    <a:masterClrMapping/>
-  </p:clrMapOvr>
-</p:notes>
-</file>
-
-<file path=ppt/notesSlides/notesSlide6.xml><?xml version="1.0" encoding="utf-8"?>
-<p:notes xmlns:a="http://schemas.openxmlformats.org/drawingml/2006/main" xmlns:r="http://schemas.openxmlformats.org/officeDocument/2006/relationships" xmlns:p="http://schemas.openxmlformats.org/presentationml/2006/main">
-  <p:cSld>
-    <p:spTree>
-      <p:nvGrpSpPr>
-        <p:cNvPr id="1" name=""/>
-        <p:cNvGrpSpPr/>
-        <p:nvPr/>
-      </p:nvGrpSpPr>
-      <p:grpSpPr>
-        <a:xfrm>
-          <a:off x="0" y="0"/>
-          <a:ext cx="0" cy="0"/>
-          <a:chOff x="0" y="0"/>
-          <a:chExt cx="0" cy="0"/>
-        </a:xfrm>
-      </p:grpSpPr>
-      <p:sp>
-        <p:nvSpPr>
-          <p:cNvPr id="2" name="Slide Image Placeholder 1"/>
-          <p:cNvSpPr>
-            <a:spLocks noGrp="1" noRot="1" noChangeAspect="1"/>
-          </p:cNvSpPr>
-          <p:nvPr>
-            <p:ph type="sldImg"/>
-          </p:nvPr>
-        </p:nvSpPr>
-        <p:spPr/>
-      </p:sp>
-      <p:sp>
-        <p:nvSpPr>
-          <p:cNvPr id="3" name="Notes Placeholder 2"/>
-          <p:cNvSpPr>
-            <a:spLocks noGrp="1"/>
-          </p:cNvSpPr>
-          <p:nvPr>
-            <p:ph type="body" idx="1"/>
-          </p:nvPr>
-        </p:nvSpPr>
-        <p:spPr/>
-        <p:txBody>
-          <a:bodyPr/>
-          <a:lstStyle/>
-          <a:p>
-            <a:r>
-              <a:rPr lang="en-SG" dirty="0"/>
-              <a:t>Update event-Before</a:t>
-            </a:r>
-          </a:p>
-        </p:txBody>
-      </p:sp>
-      <p:sp>
-        <p:nvSpPr>
-          <p:cNvPr id="4" name="Slide Number Placeholder 3"/>
-          <p:cNvSpPr>
-            <a:spLocks noGrp="1"/>
-          </p:cNvSpPr>
-          <p:nvPr>
-            <p:ph type="sldNum" sz="quarter" idx="5"/>
-          </p:nvPr>
-        </p:nvSpPr>
-        <p:spPr/>
-        <p:txBody>
-          <a:bodyPr/>
-          <a:lstStyle/>
-          <a:p>
-            <a:fld id="{B95B430D-E7DD-4DF8-8575-3B92DE16C99B}" type="slidenum">
-              <a:rPr lang="en-SG" smtClean="0"/>
-              <a:t>6</a:t>
-            </a:fld>
-            <a:endParaRPr lang="en-SG"/>
-          </a:p>
-        </p:txBody>
-      </p:sp>
-    </p:spTree>
-    <p:extLst>
-      <p:ext uri="{BB962C8B-B14F-4D97-AF65-F5344CB8AC3E}">
-        <p14:creationId xmlns:p14="http://schemas.microsoft.com/office/powerpoint/2010/main" val="690589657"/>
-      </p:ext>
-    </p:extLst>
-  </p:cSld>
-  <p:clrMapOvr>
-    <a:masterClrMapping/>
-  </p:clrMapOvr>
-</p:notes>
-</file>
-
-<file path=ppt/notesSlides/notesSlide7.xml><?xml version="1.0" encoding="utf-8"?>
-<p:notes xmlns:a="http://schemas.openxmlformats.org/drawingml/2006/main" xmlns:r="http://schemas.openxmlformats.org/officeDocument/2006/relationships" xmlns:p="http://schemas.openxmlformats.org/presentationml/2006/main">
-  <p:cSld>
-    <p:spTree>
-      <p:nvGrpSpPr>
-        <p:cNvPr id="1" name=""/>
-        <p:cNvGrpSpPr/>
-        <p:nvPr/>
-      </p:nvGrpSpPr>
-      <p:grpSpPr>
-        <a:xfrm>
-          <a:off x="0" y="0"/>
-          <a:ext cx="0" cy="0"/>
-          <a:chOff x="0" y="0"/>
-          <a:chExt cx="0" cy="0"/>
-        </a:xfrm>
-      </p:grpSpPr>
-      <p:sp>
-        <p:nvSpPr>
-          <p:cNvPr id="2" name="Slide Image Placeholder 1"/>
-          <p:cNvSpPr>
-            <a:spLocks noGrp="1" noRot="1" noChangeAspect="1"/>
-          </p:cNvSpPr>
-          <p:nvPr>
-            <p:ph type="sldImg"/>
-          </p:nvPr>
-        </p:nvSpPr>
-        <p:spPr/>
-      </p:sp>
-      <p:sp>
-        <p:nvSpPr>
-          <p:cNvPr id="3" name="Notes Placeholder 2"/>
-          <p:cNvSpPr>
-            <a:spLocks noGrp="1"/>
-          </p:cNvSpPr>
-          <p:nvPr>
-            <p:ph type="body" idx="1"/>
-          </p:nvPr>
-        </p:nvSpPr>
-        <p:spPr/>
-        <p:txBody>
-          <a:bodyPr/>
-          <a:lstStyle/>
-          <a:p>
-            <a:r>
-              <a:rPr lang="en-SG" dirty="0"/>
-              <a:t>Update event-After</a:t>
-            </a:r>
-          </a:p>
-        </p:txBody>
-      </p:sp>
-      <p:sp>
-        <p:nvSpPr>
-          <p:cNvPr id="4" name="Slide Number Placeholder 3"/>
-          <p:cNvSpPr>
-            <a:spLocks noGrp="1"/>
-          </p:cNvSpPr>
-          <p:nvPr>
-            <p:ph type="sldNum" sz="quarter" idx="5"/>
-          </p:nvPr>
-        </p:nvSpPr>
-        <p:spPr/>
-        <p:txBody>
-          <a:bodyPr/>
-          <a:lstStyle/>
-          <a:p>
-            <a:fld id="{B95B430D-E7DD-4DF8-8575-3B92DE16C99B}" type="slidenum">
-              <a:rPr lang="en-SG" smtClean="0"/>
-              <a:t>7</a:t>
-            </a:fld>
-            <a:endParaRPr lang="en-SG"/>
-          </a:p>
-        </p:txBody>
-      </p:sp>
-    </p:spTree>
-    <p:extLst>
-      <p:ext uri="{BB962C8B-B14F-4D97-AF65-F5344CB8AC3E}">
-        <p14:creationId xmlns:p14="http://schemas.microsoft.com/office/powerpoint/2010/main" val="1078206833"/>
+        <p14:creationId xmlns:p14="http://schemas.microsoft.com/office/powerpoint/2010/main" val="1247066827"/>
       </p:ext>
     </p:extLst>
   </p:cSld>
@@ -1386,7 +1129,7 @@
           <a:p>
             <a:fld id="{D5245D7B-ED48-4D86-BCCB-2CB84AF08DCA}" type="datetimeFigureOut">
               <a:rPr lang="en-SG" smtClean="0"/>
-              <a:t>31/10/2018</a:t>
+              <a:t>2/11/2018</a:t>
             </a:fld>
             <a:endParaRPr lang="en-SG"/>
           </a:p>
@@ -1586,7 +1329,7 @@
           <a:p>
             <a:fld id="{D5245D7B-ED48-4D86-BCCB-2CB84AF08DCA}" type="datetimeFigureOut">
               <a:rPr lang="en-SG" smtClean="0"/>
-              <a:t>31/10/2018</a:t>
+              <a:t>2/11/2018</a:t>
             </a:fld>
             <a:endParaRPr lang="en-SG"/>
           </a:p>
@@ -1796,7 +1539,7 @@
           <a:p>
             <a:fld id="{D5245D7B-ED48-4D86-BCCB-2CB84AF08DCA}" type="datetimeFigureOut">
               <a:rPr lang="en-SG" smtClean="0"/>
-              <a:t>31/10/2018</a:t>
+              <a:t>2/11/2018</a:t>
             </a:fld>
             <a:endParaRPr lang="en-SG"/>
           </a:p>
@@ -1996,7 +1739,7 @@
           <a:p>
             <a:fld id="{D5245D7B-ED48-4D86-BCCB-2CB84AF08DCA}" type="datetimeFigureOut">
               <a:rPr lang="en-SG" smtClean="0"/>
-              <a:t>31/10/2018</a:t>
+              <a:t>2/11/2018</a:t>
             </a:fld>
             <a:endParaRPr lang="en-SG"/>
           </a:p>
@@ -2272,7 +2015,7 @@
           <a:p>
             <a:fld id="{D5245D7B-ED48-4D86-BCCB-2CB84AF08DCA}" type="datetimeFigureOut">
               <a:rPr lang="en-SG" smtClean="0"/>
-              <a:t>31/10/2018</a:t>
+              <a:t>2/11/2018</a:t>
             </a:fld>
             <a:endParaRPr lang="en-SG"/>
           </a:p>
@@ -2540,7 +2283,7 @@
           <a:p>
             <a:fld id="{D5245D7B-ED48-4D86-BCCB-2CB84AF08DCA}" type="datetimeFigureOut">
               <a:rPr lang="en-SG" smtClean="0"/>
-              <a:t>31/10/2018</a:t>
+              <a:t>2/11/2018</a:t>
             </a:fld>
             <a:endParaRPr lang="en-SG"/>
           </a:p>
@@ -2955,7 +2698,7 @@
           <a:p>
             <a:fld id="{D5245D7B-ED48-4D86-BCCB-2CB84AF08DCA}" type="datetimeFigureOut">
               <a:rPr lang="en-SG" smtClean="0"/>
-              <a:t>31/10/2018</a:t>
+              <a:t>2/11/2018</a:t>
             </a:fld>
             <a:endParaRPr lang="en-SG"/>
           </a:p>
@@ -3097,7 +2840,7 @@
           <a:p>
             <a:fld id="{D5245D7B-ED48-4D86-BCCB-2CB84AF08DCA}" type="datetimeFigureOut">
               <a:rPr lang="en-SG" smtClean="0"/>
-              <a:t>31/10/2018</a:t>
+              <a:t>2/11/2018</a:t>
             </a:fld>
             <a:endParaRPr lang="en-SG"/>
           </a:p>
@@ -3210,7 +2953,7 @@
           <a:p>
             <a:fld id="{D5245D7B-ED48-4D86-BCCB-2CB84AF08DCA}" type="datetimeFigureOut">
               <a:rPr lang="en-SG" smtClean="0"/>
-              <a:t>31/10/2018</a:t>
+              <a:t>2/11/2018</a:t>
             </a:fld>
             <a:endParaRPr lang="en-SG"/>
           </a:p>
@@ -3523,7 +3266,7 @@
           <a:p>
             <a:fld id="{D5245D7B-ED48-4D86-BCCB-2CB84AF08DCA}" type="datetimeFigureOut">
               <a:rPr lang="en-SG" smtClean="0"/>
-              <a:t>31/10/2018</a:t>
+              <a:t>2/11/2018</a:t>
             </a:fld>
             <a:endParaRPr lang="en-SG"/>
           </a:p>
@@ -3812,7 +3555,7 @@
           <a:p>
             <a:fld id="{D5245D7B-ED48-4D86-BCCB-2CB84AF08DCA}" type="datetimeFigureOut">
               <a:rPr lang="en-SG" smtClean="0"/>
-              <a:t>31/10/2018</a:t>
+              <a:t>2/11/2018</a:t>
             </a:fld>
             <a:endParaRPr lang="en-SG"/>
           </a:p>
@@ -4055,7 +3798,7 @@
           <a:p>
             <a:fld id="{D5245D7B-ED48-4D86-BCCB-2CB84AF08DCA}" type="datetimeFigureOut">
               <a:rPr lang="en-SG" smtClean="0"/>
-              <a:t>31/10/2018</a:t>
+              <a:t>2/11/2018</a:t>
             </a:fld>
             <a:endParaRPr lang="en-SG"/>
           </a:p>
@@ -4472,12 +4215,64 @@
           <a:chExt cx="0" cy="0"/>
         </a:xfrm>
       </p:grpSpPr>
+      <p:sp>
+        <p:nvSpPr>
+          <p:cNvPr id="5" name="Arrow: Right 4">
+            <a:extLst>
+              <a:ext uri="{FF2B5EF4-FFF2-40B4-BE49-F238E27FC236}">
+                <a16:creationId xmlns:a16="http://schemas.microsoft.com/office/drawing/2014/main" id="{E8C3AB5F-A4C0-4912-A2E7-30D5D08597B0}"/>
+              </a:ext>
+            </a:extLst>
+          </p:cNvPr>
+          <p:cNvSpPr/>
+          <p:nvPr/>
+        </p:nvSpPr>
+        <p:spPr>
+          <a:xfrm>
+            <a:off x="5585255" y="3120081"/>
+            <a:ext cx="1062681" cy="617838"/>
+          </a:xfrm>
+          <a:prstGeom prst="rightArrow">
+            <a:avLst/>
+          </a:prstGeom>
+          <a:solidFill>
+            <a:srgbClr val="FF0000"/>
+          </a:solidFill>
+          <a:ln>
+            <a:noFill/>
+          </a:ln>
+        </p:spPr>
+        <p:style>
+          <a:lnRef idx="2">
+            <a:schemeClr val="accent1">
+              <a:shade val="50000"/>
+            </a:schemeClr>
+          </a:lnRef>
+          <a:fillRef idx="1">
+            <a:schemeClr val="accent1"/>
+          </a:fillRef>
+          <a:effectRef idx="0">
+            <a:schemeClr val="accent1"/>
+          </a:effectRef>
+          <a:fontRef idx="minor">
+            <a:schemeClr val="lt1"/>
+          </a:fontRef>
+        </p:style>
+        <p:txBody>
+          <a:bodyPr rtlCol="0" anchor="ctr"/>
+          <a:lstStyle/>
+          <a:p>
+            <a:pPr algn="ctr"/>
+            <a:endParaRPr lang="en-US"/>
+          </a:p>
+        </p:txBody>
+      </p:sp>
       <p:pic>
         <p:nvPicPr>
-          <p:cNvPr id="10" name="Picture 9">
-            <a:extLst>
-              <a:ext uri="{FF2B5EF4-FFF2-40B4-BE49-F238E27FC236}">
-                <a16:creationId xmlns:a16="http://schemas.microsoft.com/office/drawing/2014/main" id="{079454F4-3FD5-4354-AEB2-9ECEDAACA1E1}"/>
+          <p:cNvPr id="6" name="Picture 5">
+            <a:extLst>
+              <a:ext uri="{FF2B5EF4-FFF2-40B4-BE49-F238E27FC236}">
+                <a16:creationId xmlns:a16="http://schemas.microsoft.com/office/drawing/2014/main" id="{43EE9ED9-8E68-43D5-8147-53336F72D981}"/>
               </a:ext>
             </a:extLst>
           </p:cNvPr>
@@ -4486,28 +4281,56 @@
           </p:cNvPicPr>
           <p:nvPr/>
         </p:nvPicPr>
-        <p:blipFill>
+        <p:blipFill rotWithShape="1">
           <a:blip r:embed="rId3"/>
-          <a:stretch>
-            <a:fillRect/>
-          </a:stretch>
+          <a:srcRect b="45405"/>
+          <a:stretch/>
         </p:blipFill>
         <p:spPr>
           <a:xfrm>
-            <a:off x="4190010" y="0"/>
-            <a:ext cx="3811979" cy="6863617"/>
+            <a:off x="1408115" y="809367"/>
+            <a:ext cx="4020807" cy="3744097"/>
           </a:xfrm>
           <a:prstGeom prst="rect">
             <a:avLst/>
           </a:prstGeom>
         </p:spPr>
       </p:pic>
-      <p:sp>
-        <p:nvSpPr>
-          <p:cNvPr id="7" name="Oval 6">
-            <a:extLst>
-              <a:ext uri="{FF2B5EF4-FFF2-40B4-BE49-F238E27FC236}">
-                <a16:creationId xmlns:a16="http://schemas.microsoft.com/office/drawing/2014/main" id="{46F24007-1D4E-4E05-9D84-D29B2B74BCB7}"/>
+      <p:pic>
+        <p:nvPicPr>
+          <p:cNvPr id="7" name="Picture 6">
+            <a:extLst>
+              <a:ext uri="{FF2B5EF4-FFF2-40B4-BE49-F238E27FC236}">
+                <a16:creationId xmlns:a16="http://schemas.microsoft.com/office/drawing/2014/main" id="{B389AF54-58FA-4A59-862C-95189C3B03B7}"/>
+              </a:ext>
+            </a:extLst>
+          </p:cNvPr>
+          <p:cNvPicPr>
+            <a:picLocks noChangeAspect="1"/>
+          </p:cNvPicPr>
+          <p:nvPr/>
+        </p:nvPicPr>
+        <p:blipFill rotWithShape="1">
+          <a:blip r:embed="rId4"/>
+          <a:srcRect b="23063"/>
+          <a:stretch/>
+        </p:blipFill>
+        <p:spPr>
+          <a:xfrm>
+            <a:off x="6804269" y="790832"/>
+            <a:ext cx="4024403" cy="5276335"/>
+          </a:xfrm>
+          <a:prstGeom prst="rect">
+            <a:avLst/>
+          </a:prstGeom>
+        </p:spPr>
+      </p:pic>
+      <p:sp>
+        <p:nvSpPr>
+          <p:cNvPr id="8" name="Rectangle 7">
+            <a:extLst>
+              <a:ext uri="{FF2B5EF4-FFF2-40B4-BE49-F238E27FC236}">
+                <a16:creationId xmlns:a16="http://schemas.microsoft.com/office/drawing/2014/main" id="{E4717CF6-347A-4D48-9CC9-F54021AC05DE}"/>
               </a:ext>
             </a:extLst>
           </p:cNvPr>
@@ -4516,10 +4339,10 @@
         </p:nvSpPr>
         <p:spPr>
           <a:xfrm>
-            <a:off x="4350329" y="698047"/>
-            <a:ext cx="342900" cy="323850"/>
+            <a:off x="6804269" y="4517425"/>
+            <a:ext cx="3979616" cy="1549742"/>
           </a:xfrm>
-          <a:prstGeom prst="ellipse">
+          <a:prstGeom prst="rect">
             <a:avLst/>
           </a:prstGeom>
           <a:noFill/>
@@ -4554,114 +4377,10 @@
           </a:p>
         </p:txBody>
       </p:sp>
-      <p:sp>
-        <p:nvSpPr>
-          <p:cNvPr id="8" name="Oval 7">
-            <a:extLst>
-              <a:ext uri="{FF2B5EF4-FFF2-40B4-BE49-F238E27FC236}">
-                <a16:creationId xmlns:a16="http://schemas.microsoft.com/office/drawing/2014/main" id="{320E809B-7E38-440E-9F0F-605C0930FDAA}"/>
-              </a:ext>
-            </a:extLst>
-          </p:cNvPr>
-          <p:cNvSpPr/>
-          <p:nvPr/>
-        </p:nvSpPr>
-        <p:spPr>
-          <a:xfrm>
-            <a:off x="4350329" y="2154283"/>
-            <a:ext cx="342900" cy="323850"/>
-          </a:xfrm>
-          <a:prstGeom prst="ellipse">
-            <a:avLst/>
-          </a:prstGeom>
-          <a:noFill/>
-          <a:ln w="38100">
-            <a:solidFill>
-              <a:srgbClr val="FF0000"/>
-            </a:solidFill>
-          </a:ln>
-        </p:spPr>
-        <p:style>
-          <a:lnRef idx="2">
-            <a:schemeClr val="accent1">
-              <a:shade val="50000"/>
-            </a:schemeClr>
-          </a:lnRef>
-          <a:fillRef idx="1">
-            <a:schemeClr val="accent1"/>
-          </a:fillRef>
-          <a:effectRef idx="0">
-            <a:schemeClr val="accent1"/>
-          </a:effectRef>
-          <a:fontRef idx="minor">
-            <a:schemeClr val="lt1"/>
-          </a:fontRef>
-        </p:style>
-        <p:txBody>
-          <a:bodyPr rtlCol="0" anchor="ctr"/>
-          <a:lstStyle/>
-          <a:p>
-            <a:pPr algn="ctr"/>
-            <a:endParaRPr lang="en-SG"/>
-          </a:p>
-        </p:txBody>
-      </p:sp>
-      <p:sp>
-        <p:nvSpPr>
-          <p:cNvPr id="9" name="Oval 8">
-            <a:extLst>
-              <a:ext uri="{FF2B5EF4-FFF2-40B4-BE49-F238E27FC236}">
-                <a16:creationId xmlns:a16="http://schemas.microsoft.com/office/drawing/2014/main" id="{89321DC0-77E1-4048-855A-7C0AF81D5109}"/>
-              </a:ext>
-            </a:extLst>
-          </p:cNvPr>
-          <p:cNvSpPr/>
-          <p:nvPr/>
-        </p:nvSpPr>
-        <p:spPr>
-          <a:xfrm>
-            <a:off x="4338454" y="3610519"/>
-            <a:ext cx="342900" cy="323850"/>
-          </a:xfrm>
-          <a:prstGeom prst="ellipse">
-            <a:avLst/>
-          </a:prstGeom>
-          <a:noFill/>
-          <a:ln w="38100">
-            <a:solidFill>
-              <a:srgbClr val="FF0000"/>
-            </a:solidFill>
-          </a:ln>
-        </p:spPr>
-        <p:style>
-          <a:lnRef idx="2">
-            <a:schemeClr val="accent1">
-              <a:shade val="50000"/>
-            </a:schemeClr>
-          </a:lnRef>
-          <a:fillRef idx="1">
-            <a:schemeClr val="accent1"/>
-          </a:fillRef>
-          <a:effectRef idx="0">
-            <a:schemeClr val="accent1"/>
-          </a:effectRef>
-          <a:fontRef idx="minor">
-            <a:schemeClr val="lt1"/>
-          </a:fontRef>
-        </p:style>
-        <p:txBody>
-          <a:bodyPr rtlCol="0" anchor="ctr"/>
-          <a:lstStyle/>
-          <a:p>
-            <a:pPr algn="ctr"/>
-            <a:endParaRPr lang="en-SG"/>
-          </a:p>
-        </p:txBody>
-      </p:sp>
     </p:spTree>
     <p:extLst>
       <p:ext uri="{BB962C8B-B14F-4D97-AF65-F5344CB8AC3E}">
-        <p14:creationId xmlns:p14="http://schemas.microsoft.com/office/powerpoint/2010/main" val="4188519581"/>
+        <p14:creationId xmlns:p14="http://schemas.microsoft.com/office/powerpoint/2010/main" val="2852734552"/>
       </p:ext>
     </p:extLst>
   </p:cSld>
@@ -4688,12 +4407,64 @@
           <a:chExt cx="0" cy="0"/>
         </a:xfrm>
       </p:grpSpPr>
+      <p:sp>
+        <p:nvSpPr>
+          <p:cNvPr id="5" name="Arrow: Right 4">
+            <a:extLst>
+              <a:ext uri="{FF2B5EF4-FFF2-40B4-BE49-F238E27FC236}">
+                <a16:creationId xmlns:a16="http://schemas.microsoft.com/office/drawing/2014/main" id="{E8C3AB5F-A4C0-4912-A2E7-30D5D08597B0}"/>
+              </a:ext>
+            </a:extLst>
+          </p:cNvPr>
+          <p:cNvSpPr/>
+          <p:nvPr/>
+        </p:nvSpPr>
+        <p:spPr>
+          <a:xfrm>
+            <a:off x="5585255" y="3120081"/>
+            <a:ext cx="1062681" cy="617838"/>
+          </a:xfrm>
+          <a:prstGeom prst="rightArrow">
+            <a:avLst/>
+          </a:prstGeom>
+          <a:solidFill>
+            <a:srgbClr val="FF0000"/>
+          </a:solidFill>
+          <a:ln>
+            <a:noFill/>
+          </a:ln>
+        </p:spPr>
+        <p:style>
+          <a:lnRef idx="2">
+            <a:schemeClr val="accent1">
+              <a:shade val="50000"/>
+            </a:schemeClr>
+          </a:lnRef>
+          <a:fillRef idx="1">
+            <a:schemeClr val="accent1"/>
+          </a:fillRef>
+          <a:effectRef idx="0">
+            <a:schemeClr val="accent1"/>
+          </a:effectRef>
+          <a:fontRef idx="minor">
+            <a:schemeClr val="lt1"/>
+          </a:fontRef>
+        </p:style>
+        <p:txBody>
+          <a:bodyPr rtlCol="0" anchor="ctr"/>
+          <a:lstStyle/>
+          <a:p>
+            <a:pPr algn="ctr"/>
+            <a:endParaRPr lang="en-US"/>
+          </a:p>
+        </p:txBody>
+      </p:sp>
       <p:pic>
         <p:nvPicPr>
-          <p:cNvPr id="5" name="Picture 4">
-            <a:extLst>
-              <a:ext uri="{FF2B5EF4-FFF2-40B4-BE49-F238E27FC236}">
-                <a16:creationId xmlns:a16="http://schemas.microsoft.com/office/drawing/2014/main" id="{8A6C0D27-A076-40A2-B112-360546C7DDB0}"/>
+          <p:cNvPr id="6" name="Picture 5">
+            <a:extLst>
+              <a:ext uri="{FF2B5EF4-FFF2-40B4-BE49-F238E27FC236}">
+                <a16:creationId xmlns:a16="http://schemas.microsoft.com/office/drawing/2014/main" id="{43EE9ED9-8E68-43D5-8147-53336F72D981}"/>
               </a:ext>
             </a:extLst>
           </p:cNvPr>
@@ -4702,26 +4473,106 @@
           </p:cNvPicPr>
           <p:nvPr/>
         </p:nvPicPr>
-        <p:blipFill>
+        <p:blipFill rotWithShape="1">
           <a:blip r:embed="rId3"/>
-          <a:stretch>
-            <a:fillRect/>
-          </a:stretch>
+          <a:srcRect b="45405"/>
+          <a:stretch/>
         </p:blipFill>
         <p:spPr>
           <a:xfrm>
-            <a:off x="4190010" y="-5617"/>
-            <a:ext cx="3811979" cy="6863617"/>
+            <a:off x="1408115" y="803189"/>
+            <a:ext cx="4020807" cy="3744097"/>
           </a:xfrm>
           <a:prstGeom prst="rect">
             <a:avLst/>
           </a:prstGeom>
         </p:spPr>
       </p:pic>
+      <p:pic>
+        <p:nvPicPr>
+          <p:cNvPr id="2" name="Picture 1">
+            <a:extLst>
+              <a:ext uri="{FF2B5EF4-FFF2-40B4-BE49-F238E27FC236}">
+                <a16:creationId xmlns:a16="http://schemas.microsoft.com/office/drawing/2014/main" id="{1618A2DA-6BE5-49E2-A16D-4FB27D6B4CEF}"/>
+              </a:ext>
+            </a:extLst>
+          </p:cNvPr>
+          <p:cNvPicPr>
+            <a:picLocks noChangeAspect="1"/>
+          </p:cNvPicPr>
+          <p:nvPr/>
+        </p:nvPicPr>
+        <p:blipFill rotWithShape="1">
+          <a:blip r:embed="rId4"/>
+          <a:srcRect b="23063"/>
+          <a:stretch/>
+        </p:blipFill>
+        <p:spPr>
+          <a:xfrm>
+            <a:off x="6804269" y="790832"/>
+            <a:ext cx="4029510" cy="5276335"/>
+          </a:xfrm>
+          <a:prstGeom prst="rect">
+            <a:avLst/>
+          </a:prstGeom>
+        </p:spPr>
+      </p:pic>
+      <p:sp>
+        <p:nvSpPr>
+          <p:cNvPr id="8" name="Rectangle 7">
+            <a:extLst>
+              <a:ext uri="{FF2B5EF4-FFF2-40B4-BE49-F238E27FC236}">
+                <a16:creationId xmlns:a16="http://schemas.microsoft.com/office/drawing/2014/main" id="{D894EE46-194A-4066-BEF7-09F548F32520}"/>
+              </a:ext>
+            </a:extLst>
+          </p:cNvPr>
+          <p:cNvSpPr/>
+          <p:nvPr/>
+        </p:nvSpPr>
+        <p:spPr>
+          <a:xfrm>
+            <a:off x="6804269" y="4517425"/>
+            <a:ext cx="3979616" cy="1549742"/>
+          </a:xfrm>
+          <a:prstGeom prst="rect">
+            <a:avLst/>
+          </a:prstGeom>
+          <a:noFill/>
+          <a:ln w="38100">
+            <a:solidFill>
+              <a:srgbClr val="FF0000"/>
+            </a:solidFill>
+          </a:ln>
+        </p:spPr>
+        <p:style>
+          <a:lnRef idx="2">
+            <a:schemeClr val="accent1">
+              <a:shade val="50000"/>
+            </a:schemeClr>
+          </a:lnRef>
+          <a:fillRef idx="1">
+            <a:schemeClr val="accent1"/>
+          </a:fillRef>
+          <a:effectRef idx="0">
+            <a:schemeClr val="accent1"/>
+          </a:effectRef>
+          <a:fontRef idx="minor">
+            <a:schemeClr val="lt1"/>
+          </a:fontRef>
+        </p:style>
+        <p:txBody>
+          <a:bodyPr rtlCol="0" anchor="ctr"/>
+          <a:lstStyle/>
+          <a:p>
+            <a:pPr algn="ctr"/>
+            <a:endParaRPr lang="en-SG" dirty="0"/>
+          </a:p>
+        </p:txBody>
+      </p:sp>
     </p:spTree>
     <p:extLst>
       <p:ext uri="{BB962C8B-B14F-4D97-AF65-F5344CB8AC3E}">
-        <p14:creationId xmlns:p14="http://schemas.microsoft.com/office/powerpoint/2010/main" val="1198764428"/>
+        <p14:creationId xmlns:p14="http://schemas.microsoft.com/office/powerpoint/2010/main" val="678142368"/>
       </p:ext>
     </p:extLst>
   </p:cSld>
@@ -4750,10 +4601,10 @@
       </p:grpSpPr>
       <p:pic>
         <p:nvPicPr>
-          <p:cNvPr id="6" name="Picture 5">
-            <a:extLst>
-              <a:ext uri="{FF2B5EF4-FFF2-40B4-BE49-F238E27FC236}">
-                <a16:creationId xmlns:a16="http://schemas.microsoft.com/office/drawing/2014/main" id="{36719709-B20A-4F79-BA72-7E9C46854DB9}"/>
+          <p:cNvPr id="5" name="Picture 4">
+            <a:extLst>
+              <a:ext uri="{FF2B5EF4-FFF2-40B4-BE49-F238E27FC236}">
+                <a16:creationId xmlns:a16="http://schemas.microsoft.com/office/drawing/2014/main" id="{54E6BD0F-5573-41B9-A233-2989062B9A6C}"/>
               </a:ext>
             </a:extLst>
           </p:cNvPr>
@@ -4762,16 +4613,15 @@
           </p:cNvPicPr>
           <p:nvPr/>
         </p:nvPicPr>
-        <p:blipFill>
+        <p:blipFill rotWithShape="1">
           <a:blip r:embed="rId3"/>
-          <a:stretch>
-            <a:fillRect/>
-          </a:stretch>
+          <a:srcRect b="45585"/>
+          <a:stretch/>
         </p:blipFill>
         <p:spPr>
           <a:xfrm>
-            <a:off x="4191570" y="0"/>
-            <a:ext cx="3808859" cy="6858000"/>
+            <a:off x="4085596" y="1383956"/>
+            <a:ext cx="4020807" cy="3731741"/>
           </a:xfrm>
           <a:prstGeom prst="rect">
             <a:avLst/>
@@ -4780,10 +4630,10 @@
       </p:pic>
       <p:sp>
         <p:nvSpPr>
-          <p:cNvPr id="7" name="Rectangle 6">
-            <a:extLst>
-              <a:ext uri="{FF2B5EF4-FFF2-40B4-BE49-F238E27FC236}">
-                <a16:creationId xmlns:a16="http://schemas.microsoft.com/office/drawing/2014/main" id="{AB353266-0C93-4569-9762-EAC41DE861FE}"/>
+          <p:cNvPr id="6" name="Oval 5">
+            <a:extLst>
+              <a:ext uri="{FF2B5EF4-FFF2-40B4-BE49-F238E27FC236}">
+                <a16:creationId xmlns:a16="http://schemas.microsoft.com/office/drawing/2014/main" id="{E56BA28E-1EED-4E84-AB9E-299984CD21DD}"/>
               </a:ext>
             </a:extLst>
           </p:cNvPr>
@@ -4792,10 +4642,10 @@
         </p:nvSpPr>
         <p:spPr>
           <a:xfrm>
-            <a:off x="4191570" y="4945578"/>
-            <a:ext cx="3808859" cy="1476375"/>
+            <a:off x="4283162" y="2143123"/>
+            <a:ext cx="304800" cy="332509"/>
           </a:xfrm>
-          <a:prstGeom prst="rect">
+          <a:prstGeom prst="ellipse">
             <a:avLst/>
           </a:prstGeom>
           <a:noFill/>
@@ -4830,10 +4680,62 @@
           </a:p>
         </p:txBody>
       </p:sp>
+      <p:sp>
+        <p:nvSpPr>
+          <p:cNvPr id="7" name="Oval 6">
+            <a:extLst>
+              <a:ext uri="{FF2B5EF4-FFF2-40B4-BE49-F238E27FC236}">
+                <a16:creationId xmlns:a16="http://schemas.microsoft.com/office/drawing/2014/main" id="{1065EC1E-9F18-491B-9D8C-64DC7A26E30F}"/>
+              </a:ext>
+            </a:extLst>
+          </p:cNvPr>
+          <p:cNvSpPr/>
+          <p:nvPr/>
+        </p:nvSpPr>
+        <p:spPr>
+          <a:xfrm>
+            <a:off x="4283162" y="3704193"/>
+            <a:ext cx="304800" cy="332509"/>
+          </a:xfrm>
+          <a:prstGeom prst="ellipse">
+            <a:avLst/>
+          </a:prstGeom>
+          <a:noFill/>
+          <a:ln w="38100">
+            <a:solidFill>
+              <a:srgbClr val="FF0000"/>
+            </a:solidFill>
+          </a:ln>
+        </p:spPr>
+        <p:style>
+          <a:lnRef idx="2">
+            <a:schemeClr val="accent1">
+              <a:shade val="50000"/>
+            </a:schemeClr>
+          </a:lnRef>
+          <a:fillRef idx="1">
+            <a:schemeClr val="accent1"/>
+          </a:fillRef>
+          <a:effectRef idx="0">
+            <a:schemeClr val="accent1"/>
+          </a:effectRef>
+          <a:fontRef idx="minor">
+            <a:schemeClr val="lt1"/>
+          </a:fontRef>
+        </p:style>
+        <p:txBody>
+          <a:bodyPr rtlCol="0" anchor="ctr"/>
+          <a:lstStyle/>
+          <a:p>
+            <a:pPr algn="ctr"/>
+            <a:endParaRPr lang="en-SG" dirty="0"/>
+          </a:p>
+        </p:txBody>
+      </p:sp>
     </p:spTree>
     <p:extLst>
       <p:ext uri="{BB962C8B-B14F-4D97-AF65-F5344CB8AC3E}">
-        <p14:creationId xmlns:p14="http://schemas.microsoft.com/office/powerpoint/2010/main" val="1658843613"/>
+        <p14:creationId xmlns:p14="http://schemas.microsoft.com/office/powerpoint/2010/main" val="4085500526"/>
       </p:ext>
     </p:extLst>
   </p:cSld>
@@ -4865,7 +4767,7 @@
           <p:cNvPr id="4" name="Picture 3">
             <a:extLst>
               <a:ext uri="{FF2B5EF4-FFF2-40B4-BE49-F238E27FC236}">
-                <a16:creationId xmlns:a16="http://schemas.microsoft.com/office/drawing/2014/main" id="{6FB746E7-EEB2-406C-BB6E-69FC7EBB5C99}"/>
+                <a16:creationId xmlns:a16="http://schemas.microsoft.com/office/drawing/2014/main" id="{431E0929-2507-42FD-A7B0-A98994E7FB5F}"/>
               </a:ext>
             </a:extLst>
           </p:cNvPr>
@@ -4874,16 +4776,15 @@
           </p:cNvPicPr>
           <p:nvPr/>
         </p:nvPicPr>
-        <p:blipFill>
+        <p:blipFill rotWithShape="1">
           <a:blip r:embed="rId3"/>
-          <a:stretch>
-            <a:fillRect/>
-          </a:stretch>
+          <a:srcRect b="45405"/>
+          <a:stretch/>
         </p:blipFill>
         <p:spPr>
           <a:xfrm>
-            <a:off x="4139296" y="0"/>
-            <a:ext cx="3913408" cy="6858000"/>
+            <a:off x="1408115" y="803189"/>
+            <a:ext cx="4020807" cy="3744097"/>
           </a:xfrm>
           <a:prstGeom prst="rect">
             <a:avLst/>
@@ -4892,10 +4793,10 @@
       </p:pic>
       <p:sp>
         <p:nvSpPr>
-          <p:cNvPr id="5" name="Rectangle 4">
-            <a:extLst>
-              <a:ext uri="{FF2B5EF4-FFF2-40B4-BE49-F238E27FC236}">
-                <a16:creationId xmlns:a16="http://schemas.microsoft.com/office/drawing/2014/main" id="{820F87CA-6461-4534-8478-D0E21A75D4F1}"/>
+          <p:cNvPr id="5" name="Arrow: Right 4">
+            <a:extLst>
+              <a:ext uri="{FF2B5EF4-FFF2-40B4-BE49-F238E27FC236}">
+                <a16:creationId xmlns:a16="http://schemas.microsoft.com/office/drawing/2014/main" id="{CAB46B3F-737B-4A62-BDB9-0CA917593538}"/>
               </a:ext>
             </a:extLst>
           </p:cNvPr>
@@ -4904,8 +4805,89 @@
         </p:nvSpPr>
         <p:spPr>
           <a:xfrm>
-            <a:off x="4143375" y="3924300"/>
-            <a:ext cx="3886200" cy="1476375"/>
+            <a:off x="5585255" y="2675237"/>
+            <a:ext cx="1062681" cy="617838"/>
+          </a:xfrm>
+          <a:prstGeom prst="rightArrow">
+            <a:avLst/>
+          </a:prstGeom>
+          <a:solidFill>
+            <a:srgbClr val="FF0000"/>
+          </a:solidFill>
+          <a:ln>
+            <a:noFill/>
+          </a:ln>
+        </p:spPr>
+        <p:style>
+          <a:lnRef idx="2">
+            <a:schemeClr val="accent1">
+              <a:shade val="50000"/>
+            </a:schemeClr>
+          </a:lnRef>
+          <a:fillRef idx="1">
+            <a:schemeClr val="accent1"/>
+          </a:fillRef>
+          <a:effectRef idx="0">
+            <a:schemeClr val="accent1"/>
+          </a:effectRef>
+          <a:fontRef idx="minor">
+            <a:schemeClr val="lt1"/>
+          </a:fontRef>
+        </p:style>
+        <p:txBody>
+          <a:bodyPr rtlCol="0" anchor="ctr"/>
+          <a:lstStyle/>
+          <a:p>
+            <a:pPr algn="ctr"/>
+            <a:endParaRPr lang="en-US"/>
+          </a:p>
+        </p:txBody>
+      </p:sp>
+      <p:pic>
+        <p:nvPicPr>
+          <p:cNvPr id="7" name="Picture 6">
+            <a:extLst>
+              <a:ext uri="{FF2B5EF4-FFF2-40B4-BE49-F238E27FC236}">
+                <a16:creationId xmlns:a16="http://schemas.microsoft.com/office/drawing/2014/main" id="{95B5C87E-61A1-41D6-99A1-8BCBBFB0F074}"/>
+              </a:ext>
+            </a:extLst>
+          </p:cNvPr>
+          <p:cNvPicPr>
+            <a:picLocks noChangeAspect="1"/>
+          </p:cNvPicPr>
+          <p:nvPr/>
+        </p:nvPicPr>
+        <p:blipFill rotWithShape="1">
+          <a:blip r:embed="rId4"/>
+          <a:srcRect b="46400"/>
+          <a:stretch/>
+        </p:blipFill>
+        <p:spPr>
+          <a:xfrm>
+            <a:off x="6804269" y="803189"/>
+            <a:ext cx="4056296" cy="3744097"/>
+          </a:xfrm>
+          <a:prstGeom prst="rect">
+            <a:avLst/>
+          </a:prstGeom>
+        </p:spPr>
+      </p:pic>
+      <p:sp>
+        <p:nvSpPr>
+          <p:cNvPr id="8" name="Rectangle 7">
+            <a:extLst>
+              <a:ext uri="{FF2B5EF4-FFF2-40B4-BE49-F238E27FC236}">
+                <a16:creationId xmlns:a16="http://schemas.microsoft.com/office/drawing/2014/main" id="{F2283E8B-5F16-4D41-AF0D-2C790C1376F3}"/>
+              </a:ext>
+            </a:extLst>
+          </p:cNvPr>
+          <p:cNvSpPr/>
+          <p:nvPr/>
+        </p:nvSpPr>
+        <p:spPr>
+          <a:xfrm>
+            <a:off x="6822164" y="1421081"/>
+            <a:ext cx="4056295" cy="1559625"/>
           </a:xfrm>
           <a:prstGeom prst="rect">
             <a:avLst/>
@@ -4942,10 +4924,53 @@
           </a:p>
         </p:txBody>
       </p:sp>
+      <p:cxnSp>
+        <p:nvCxnSpPr>
+          <p:cNvPr id="10" name="Straight Connector 9">
+            <a:extLst>
+              <a:ext uri="{FF2B5EF4-FFF2-40B4-BE49-F238E27FC236}">
+                <a16:creationId xmlns:a16="http://schemas.microsoft.com/office/drawing/2014/main" id="{97914EA7-1328-43DF-91AD-C0406B3B10DF}"/>
+              </a:ext>
+            </a:extLst>
+          </p:cNvPr>
+          <p:cNvCxnSpPr>
+            <a:cxnSpLocks/>
+          </p:cNvCxnSpPr>
+          <p:nvPr/>
+        </p:nvCxnSpPr>
+        <p:spPr>
+          <a:xfrm>
+            <a:off x="7362701" y="1852551"/>
+            <a:ext cx="1246910" cy="0"/>
+          </a:xfrm>
+          <a:prstGeom prst="line">
+            <a:avLst/>
+          </a:prstGeom>
+          <a:ln>
+            <a:solidFill>
+              <a:srgbClr val="FF0000"/>
+            </a:solidFill>
+          </a:ln>
+        </p:spPr>
+        <p:style>
+          <a:lnRef idx="3">
+            <a:schemeClr val="dk1"/>
+          </a:lnRef>
+          <a:fillRef idx="0">
+            <a:schemeClr val="dk1"/>
+          </a:fillRef>
+          <a:effectRef idx="2">
+            <a:schemeClr val="dk1"/>
+          </a:effectRef>
+          <a:fontRef idx="minor">
+            <a:schemeClr val="tx1"/>
+          </a:fontRef>
+        </p:style>
+      </p:cxnSp>
     </p:spTree>
     <p:extLst>
       <p:ext uri="{BB962C8B-B14F-4D97-AF65-F5344CB8AC3E}">
-        <p14:creationId xmlns:p14="http://schemas.microsoft.com/office/powerpoint/2010/main" val="4240268878"/>
+        <p14:creationId xmlns:p14="http://schemas.microsoft.com/office/powerpoint/2010/main" val="648754840"/>
       </p:ext>
     </p:extLst>
   </p:cSld>
@@ -4974,10 +4999,10 @@
       </p:grpSpPr>
       <p:pic>
         <p:nvPicPr>
-          <p:cNvPr id="4" name="Picture 3">
-            <a:extLst>
-              <a:ext uri="{FF2B5EF4-FFF2-40B4-BE49-F238E27FC236}">
-                <a16:creationId xmlns:a16="http://schemas.microsoft.com/office/drawing/2014/main" id="{721394BB-67C1-4109-A593-F6F231FE4EB4}"/>
+          <p:cNvPr id="6" name="Picture 5">
+            <a:extLst>
+              <a:ext uri="{FF2B5EF4-FFF2-40B4-BE49-F238E27FC236}">
+                <a16:creationId xmlns:a16="http://schemas.microsoft.com/office/drawing/2014/main" id="{66940FCC-3ADF-48B0-8DCD-72B666E384F5}"/>
               </a:ext>
             </a:extLst>
           </p:cNvPr>
@@ -4986,16 +5011,15 @@
           </p:cNvPicPr>
           <p:nvPr/>
         </p:nvPicPr>
-        <p:blipFill>
+        <p:blipFill rotWithShape="1">
           <a:blip r:embed="rId3"/>
-          <a:stretch>
-            <a:fillRect/>
-          </a:stretch>
+          <a:srcRect b="23713"/>
+          <a:stretch/>
         </p:blipFill>
         <p:spPr>
           <a:xfrm>
-            <a:off x="4136571" y="0"/>
-            <a:ext cx="3918857" cy="6858000"/>
+            <a:off x="1408115" y="803189"/>
+            <a:ext cx="4020807" cy="5267802"/>
           </a:xfrm>
           <a:prstGeom prst="rect">
             <a:avLst/>
@@ -5004,10 +5028,10 @@
       </p:pic>
       <p:sp>
         <p:nvSpPr>
-          <p:cNvPr id="6" name="Rectangle 5">
-            <a:extLst>
-              <a:ext uri="{FF2B5EF4-FFF2-40B4-BE49-F238E27FC236}">
-                <a16:creationId xmlns:a16="http://schemas.microsoft.com/office/drawing/2014/main" id="{3EAC8A3E-D8B9-4757-B416-926CE35B43F2}"/>
+          <p:cNvPr id="7" name="Arrow: Right 6">
+            <a:extLst>
+              <a:ext uri="{FF2B5EF4-FFF2-40B4-BE49-F238E27FC236}">
+                <a16:creationId xmlns:a16="http://schemas.microsoft.com/office/drawing/2014/main" id="{F6FBCE12-0F2C-44E0-9F8E-25A1D54A6C79}"/>
               </a:ext>
             </a:extLst>
           </p:cNvPr>
@@ -5016,17 +5040,17 @@
         </p:nvSpPr>
         <p:spPr>
           <a:xfrm>
-            <a:off x="4169228" y="3962400"/>
-            <a:ext cx="3886200" cy="1476375"/>
+            <a:off x="5585255" y="2675237"/>
+            <a:ext cx="1062681" cy="617838"/>
           </a:xfrm>
-          <a:prstGeom prst="rect">
+          <a:prstGeom prst="rightArrow">
             <a:avLst/>
           </a:prstGeom>
-          <a:noFill/>
-          <a:ln w="38100">
-            <a:solidFill>
-              <a:srgbClr val="FF0000"/>
-            </a:solidFill>
+          <a:solidFill>
+            <a:srgbClr val="FF0000"/>
+          </a:solidFill>
+          <a:ln>
+            <a:noFill/>
           </a:ln>
         </p:spPr>
         <p:style>
@@ -5050,46 +5074,16 @@
           <a:lstStyle/>
           <a:p>
             <a:pPr algn="ctr"/>
-            <a:endParaRPr lang="en-SG"/>
-          </a:p>
-        </p:txBody>
-      </p:sp>
-    </p:spTree>
-    <p:extLst>
-      <p:ext uri="{BB962C8B-B14F-4D97-AF65-F5344CB8AC3E}">
-        <p14:creationId xmlns:p14="http://schemas.microsoft.com/office/powerpoint/2010/main" val="2906102570"/>
-      </p:ext>
-    </p:extLst>
-  </p:cSld>
-  <p:clrMapOvr>
-    <a:masterClrMapping/>
-  </p:clrMapOvr>
-</p:sld>
-</file>
-
-<file path=ppt/slides/slide6.xml><?xml version="1.0" encoding="utf-8"?>
-<p:sld xmlns:a="http://schemas.openxmlformats.org/drawingml/2006/main" xmlns:r="http://schemas.openxmlformats.org/officeDocument/2006/relationships" xmlns:p="http://schemas.openxmlformats.org/presentationml/2006/main">
-  <p:cSld>
-    <p:spTree>
-      <p:nvGrpSpPr>
-        <p:cNvPr id="1" name=""/>
-        <p:cNvGrpSpPr/>
-        <p:nvPr/>
-      </p:nvGrpSpPr>
-      <p:grpSpPr>
-        <a:xfrm>
-          <a:off x="0" y="0"/>
-          <a:ext cx="0" cy="0"/>
-          <a:chOff x="0" y="0"/>
-          <a:chExt cx="0" cy="0"/>
-        </a:xfrm>
-      </p:grpSpPr>
+            <a:endParaRPr lang="en-US"/>
+          </a:p>
+        </p:txBody>
+      </p:sp>
       <p:pic>
         <p:nvPicPr>
-          <p:cNvPr id="5" name="Picture 4">
-            <a:extLst>
-              <a:ext uri="{FF2B5EF4-FFF2-40B4-BE49-F238E27FC236}">
-                <a16:creationId xmlns:a16="http://schemas.microsoft.com/office/drawing/2014/main" id="{AF469A28-B356-49C2-B086-0A0BCC4703DE}"/>
+          <p:cNvPr id="8" name="Picture 7">
+            <a:extLst>
+              <a:ext uri="{FF2B5EF4-FFF2-40B4-BE49-F238E27FC236}">
+                <a16:creationId xmlns:a16="http://schemas.microsoft.com/office/drawing/2014/main" id="{BF6D39E5-4DC9-4595-B01A-3631258A9210}"/>
               </a:ext>
             </a:extLst>
           </p:cNvPr>
@@ -5098,196 +5092,25 @@
           </p:cNvPicPr>
           <p:nvPr/>
         </p:nvPicPr>
-        <p:blipFill>
-          <a:blip r:embed="rId3">
-            <a:extLst>
-              <a:ext uri="{28A0092B-C50C-407E-A947-70E740481C1C}">
-                <a14:useLocalDpi xmlns:a14="http://schemas.microsoft.com/office/drawing/2010/main" val="0"/>
-              </a:ext>
-            </a:extLst>
-          </a:blip>
-          <a:stretch>
-            <a:fillRect/>
-          </a:stretch>
+        <p:blipFill rotWithShape="1">
+          <a:blip r:embed="rId3"/>
+          <a:srcRect b="46281"/>
+          <a:stretch/>
         </p:blipFill>
         <p:spPr>
           <a:xfrm>
-            <a:off x="4467141" y="580878"/>
-            <a:ext cx="3257717" cy="5696243"/>
+            <a:off x="6804269" y="803189"/>
+            <a:ext cx="4020807" cy="3709434"/>
           </a:xfrm>
           <a:prstGeom prst="rect">
             <a:avLst/>
           </a:prstGeom>
         </p:spPr>
       </p:pic>
-      <p:sp>
-        <p:nvSpPr>
-          <p:cNvPr id="6" name="Rectangle 5">
-            <a:extLst>
-              <a:ext uri="{FF2B5EF4-FFF2-40B4-BE49-F238E27FC236}">
-                <a16:creationId xmlns:a16="http://schemas.microsoft.com/office/drawing/2014/main" id="{12E62CAA-DE50-488F-93C7-EE72406E374A}"/>
-              </a:ext>
-            </a:extLst>
-          </p:cNvPr>
-          <p:cNvSpPr/>
-          <p:nvPr/>
-        </p:nvSpPr>
-        <p:spPr>
-          <a:xfrm>
-            <a:off x="4467225" y="1143000"/>
-            <a:ext cx="3248025" cy="1333500"/>
-          </a:xfrm>
-          <a:prstGeom prst="rect">
-            <a:avLst/>
-          </a:prstGeom>
-          <a:noFill/>
-          <a:ln w="38100">
-            <a:solidFill>
-              <a:srgbClr val="FF0000"/>
-            </a:solidFill>
-          </a:ln>
-        </p:spPr>
-        <p:style>
-          <a:lnRef idx="2">
-            <a:schemeClr val="accent1">
-              <a:shade val="50000"/>
-            </a:schemeClr>
-          </a:lnRef>
-          <a:fillRef idx="1">
-            <a:schemeClr val="accent1"/>
-          </a:fillRef>
-          <a:effectRef idx="0">
-            <a:schemeClr val="accent1"/>
-          </a:effectRef>
-          <a:fontRef idx="minor">
-            <a:schemeClr val="lt1"/>
-          </a:fontRef>
-        </p:style>
-        <p:txBody>
-          <a:bodyPr rtlCol="0" anchor="ctr"/>
-          <a:lstStyle/>
-          <a:p>
-            <a:pPr algn="ctr"/>
-            <a:endParaRPr lang="en-SG"/>
-          </a:p>
-        </p:txBody>
-      </p:sp>
     </p:spTree>
     <p:extLst>
       <p:ext uri="{BB962C8B-B14F-4D97-AF65-F5344CB8AC3E}">
-        <p14:creationId xmlns:p14="http://schemas.microsoft.com/office/powerpoint/2010/main" val="1664883752"/>
-      </p:ext>
-    </p:extLst>
-  </p:cSld>
-  <p:clrMapOvr>
-    <a:masterClrMapping/>
-  </p:clrMapOvr>
-</p:sld>
-</file>
-
-<file path=ppt/slides/slide7.xml><?xml version="1.0" encoding="utf-8"?>
-<p:sld xmlns:a="http://schemas.openxmlformats.org/drawingml/2006/main" xmlns:r="http://schemas.openxmlformats.org/officeDocument/2006/relationships" xmlns:p="http://schemas.openxmlformats.org/presentationml/2006/main">
-  <p:cSld>
-    <p:spTree>
-      <p:nvGrpSpPr>
-        <p:cNvPr id="1" name=""/>
-        <p:cNvGrpSpPr/>
-        <p:nvPr/>
-      </p:nvGrpSpPr>
-      <p:grpSpPr>
-        <a:xfrm>
-          <a:off x="0" y="0"/>
-          <a:ext cx="0" cy="0"/>
-          <a:chOff x="0" y="0"/>
-          <a:chExt cx="0" cy="0"/>
-        </a:xfrm>
-      </p:grpSpPr>
-      <p:pic>
-        <p:nvPicPr>
-          <p:cNvPr id="3" name="Picture 2">
-            <a:extLst>
-              <a:ext uri="{FF2B5EF4-FFF2-40B4-BE49-F238E27FC236}">
-                <a16:creationId xmlns:a16="http://schemas.microsoft.com/office/drawing/2014/main" id="{A66D3C53-434B-4703-9285-8B5C5FED96D5}"/>
-              </a:ext>
-            </a:extLst>
-          </p:cNvPr>
-          <p:cNvPicPr>
-            <a:picLocks noChangeAspect="1"/>
-          </p:cNvPicPr>
-          <p:nvPr/>
-        </p:nvPicPr>
-        <p:blipFill>
-          <a:blip r:embed="rId3"/>
-          <a:stretch>
-            <a:fillRect/>
-          </a:stretch>
-        </p:blipFill>
-        <p:spPr>
-          <a:xfrm>
-            <a:off x="4149090" y="0"/>
-            <a:ext cx="3893820" cy="6858000"/>
-          </a:xfrm>
-          <a:prstGeom prst="rect">
-            <a:avLst/>
-          </a:prstGeom>
-        </p:spPr>
-      </p:pic>
-      <p:sp>
-        <p:nvSpPr>
-          <p:cNvPr id="6" name="Rectangle 5">
-            <a:extLst>
-              <a:ext uri="{FF2B5EF4-FFF2-40B4-BE49-F238E27FC236}">
-                <a16:creationId xmlns:a16="http://schemas.microsoft.com/office/drawing/2014/main" id="{12E62CAA-DE50-488F-93C7-EE72406E374A}"/>
-              </a:ext>
-            </a:extLst>
-          </p:cNvPr>
-          <p:cNvSpPr/>
-          <p:nvPr/>
-        </p:nvSpPr>
-        <p:spPr>
-          <a:xfrm>
-            <a:off x="4149090" y="685799"/>
-            <a:ext cx="3893820" cy="1495425"/>
-          </a:xfrm>
-          <a:prstGeom prst="rect">
-            <a:avLst/>
-          </a:prstGeom>
-          <a:noFill/>
-          <a:ln w="38100">
-            <a:solidFill>
-              <a:srgbClr val="FF0000"/>
-            </a:solidFill>
-          </a:ln>
-        </p:spPr>
-        <p:style>
-          <a:lnRef idx="2">
-            <a:schemeClr val="accent1">
-              <a:shade val="50000"/>
-            </a:schemeClr>
-          </a:lnRef>
-          <a:fillRef idx="1">
-            <a:schemeClr val="accent1"/>
-          </a:fillRef>
-          <a:effectRef idx="0">
-            <a:schemeClr val="accent1"/>
-          </a:effectRef>
-          <a:fontRef idx="minor">
-            <a:schemeClr val="lt1"/>
-          </a:fontRef>
-        </p:style>
-        <p:txBody>
-          <a:bodyPr rtlCol="0" anchor="ctr"/>
-          <a:lstStyle/>
-          <a:p>
-            <a:pPr algn="ctr"/>
-            <a:endParaRPr lang="en-SG"/>
-          </a:p>
-        </p:txBody>
-      </p:sp>
-    </p:spTree>
-    <p:extLst>
-      <p:ext uri="{BB962C8B-B14F-4D97-AF65-F5344CB8AC3E}">
-        <p14:creationId xmlns:p14="http://schemas.microsoft.com/office/powerpoint/2010/main" val="3775683247"/>
+        <p14:creationId xmlns:p14="http://schemas.microsoft.com/office/powerpoint/2010/main" val="460314332"/>
       </p:ext>
     </p:extLst>
   </p:cSld>

</xml_diff>

<commit_message>
Update Event Management section in UserGuide.adoc
</commit_message>
<xml_diff>
--- a/docs/diagrams/Command_Event.pptx
+++ b/docs/diagrams/Command_Event.pptx
@@ -5,14 +5,16 @@
     <p:sldMasterId id="2147483648" r:id="rId1"/>
   </p:sldMasterIdLst>
   <p:notesMasterIdLst>
-    <p:notesMasterId r:id="rId7"/>
+    <p:notesMasterId r:id="rId9"/>
   </p:notesMasterIdLst>
   <p:sldIdLst>
-    <p:sldId id="261" r:id="rId2"/>
-    <p:sldId id="262" r:id="rId3"/>
-    <p:sldId id="260" r:id="rId4"/>
-    <p:sldId id="263" r:id="rId5"/>
-    <p:sldId id="264" r:id="rId6"/>
+    <p:sldId id="265" r:id="rId2"/>
+    <p:sldId id="261" r:id="rId3"/>
+    <p:sldId id="262" r:id="rId4"/>
+    <p:sldId id="260" r:id="rId5"/>
+    <p:sldId id="263" r:id="rId6"/>
+    <p:sldId id="266" r:id="rId7"/>
+    <p:sldId id="264" r:id="rId8"/>
   </p:sldIdLst>
   <p:sldSz cx="12192000" cy="6858000"/>
   <p:notesSz cx="6858000" cy="9144000"/>
@@ -514,40 +516,9 @@
           <a:lstStyle/>
           <a:p>
             <a:r>
-              <a:rPr lang="en-GB" dirty="0"/>
-              <a:t>Effect of add command</a:t>
-            </a:r>
-          </a:p>
-          <a:p>
-            <a:r>
-              <a:rPr lang="en-GB" dirty="0"/>
-              <a:t>add n/Flag Day l/Yishun MRT </a:t>
-            </a:r>
-            <a:r>
-              <a:rPr lang="en-GB" dirty="0" err="1"/>
-              <a:t>sd</a:t>
-            </a:r>
-            <a:r>
-              <a:rPr lang="en-GB" dirty="0"/>
-              <a:t>/31-10-2018 </a:t>
-            </a:r>
-            <a:r>
-              <a:rPr lang="en-GB" dirty="0" err="1"/>
-              <a:t>ed</a:t>
-            </a:r>
-            <a:r>
-              <a:rPr lang="en-GB" dirty="0"/>
-              <a:t>/31-10-2018 </a:t>
-            </a:r>
-            <a:r>
-              <a:rPr lang="en-GB" dirty="0" err="1"/>
-              <a:t>st</a:t>
-            </a:r>
-            <a:r>
-              <a:rPr lang="en-GB" dirty="0"/>
-              <a:t>/09:00 et/15:00 d/For the children’s home</a:t>
-            </a:r>
-            <a:endParaRPr lang="en-US" dirty="0"/>
+              <a:rPr lang="en-US" dirty="0"/>
+              <a:t>Before adding</a:t>
+            </a:r>
           </a:p>
         </p:txBody>
       </p:sp>
@@ -577,7 +548,7 @@
     </p:spTree>
     <p:extLst>
       <p:ext uri="{BB962C8B-B14F-4D97-AF65-F5344CB8AC3E}">
-        <p14:creationId xmlns:p14="http://schemas.microsoft.com/office/powerpoint/2010/main" val="4157101339"/>
+        <p14:creationId xmlns:p14="http://schemas.microsoft.com/office/powerpoint/2010/main" val="1563960710"/>
       </p:ext>
     </p:extLst>
   </p:cSld>
@@ -639,7 +610,7 @@
           <a:p>
             <a:r>
               <a:rPr lang="en-GB" dirty="0"/>
-              <a:t>add n/Fundraising l/Tampines Street 31 </a:t>
+              <a:t>add n/Flag Day l/Yishun MRT </a:t>
             </a:r>
             <a:r>
               <a:rPr lang="en-GB" dirty="0" err="1"/>
@@ -647,7 +618,7 @@
             </a:r>
             <a:r>
               <a:rPr lang="en-GB" dirty="0"/>
-              <a:t>/15-11-2018 </a:t>
+              <a:t>/31-10-2018 </a:t>
             </a:r>
             <a:r>
               <a:rPr lang="en-GB" dirty="0" err="1"/>
@@ -655,7 +626,7 @@
             </a:r>
             <a:r>
               <a:rPr lang="en-GB" dirty="0"/>
-              <a:t>/17-11-2018 </a:t>
+              <a:t>/31-10-2018 </a:t>
             </a:r>
             <a:r>
               <a:rPr lang="en-GB" dirty="0" err="1"/>
@@ -663,7 +634,7 @@
             </a:r>
             <a:r>
               <a:rPr lang="en-GB" dirty="0"/>
-              <a:t>/13:00 et/18:00 d/Raising funds t/fundraiser t/charity</a:t>
+              <a:t>/09:00 et/15:00 d/For the children’s home</a:t>
             </a:r>
             <a:endParaRPr lang="en-US" dirty="0"/>
           </a:p>
@@ -695,7 +666,7 @@
     </p:spTree>
     <p:extLst>
       <p:ext uri="{BB962C8B-B14F-4D97-AF65-F5344CB8AC3E}">
-        <p14:creationId xmlns:p14="http://schemas.microsoft.com/office/powerpoint/2010/main" val="2000553253"/>
+        <p14:creationId xmlns:p14="http://schemas.microsoft.com/office/powerpoint/2010/main" val="4157101339"/>
       </p:ext>
     </p:extLst>
   </p:cSld>
@@ -750,9 +721,40 @@
           <a:lstStyle/>
           <a:p>
             <a:r>
-              <a:rPr lang="en-US" dirty="0"/>
-              <a:t>EVENT_INDEX</a:t>
-            </a:r>
+              <a:rPr lang="en-GB" dirty="0"/>
+              <a:t>Effect of add command</a:t>
+            </a:r>
+          </a:p>
+          <a:p>
+            <a:r>
+              <a:rPr lang="en-GB" dirty="0"/>
+              <a:t>add n/Fundraising l/Tampines Street 31 </a:t>
+            </a:r>
+            <a:r>
+              <a:rPr lang="en-GB" dirty="0" err="1"/>
+              <a:t>sd</a:t>
+            </a:r>
+            <a:r>
+              <a:rPr lang="en-GB" dirty="0"/>
+              <a:t>/15-11-2018 </a:t>
+            </a:r>
+            <a:r>
+              <a:rPr lang="en-GB" dirty="0" err="1"/>
+              <a:t>ed</a:t>
+            </a:r>
+            <a:r>
+              <a:rPr lang="en-GB" dirty="0"/>
+              <a:t>/17-11-2018 </a:t>
+            </a:r>
+            <a:r>
+              <a:rPr lang="en-GB" dirty="0" err="1"/>
+              <a:t>st</a:t>
+            </a:r>
+            <a:r>
+              <a:rPr lang="en-GB" dirty="0"/>
+              <a:t>/13:00 et/18:00 d/Raising funds t/fundraiser t/charity</a:t>
+            </a:r>
+            <a:endParaRPr lang="en-US" dirty="0"/>
           </a:p>
         </p:txBody>
       </p:sp>
@@ -782,7 +784,7 @@
     </p:spTree>
     <p:extLst>
       <p:ext uri="{BB962C8B-B14F-4D97-AF65-F5344CB8AC3E}">
-        <p14:creationId xmlns:p14="http://schemas.microsoft.com/office/powerpoint/2010/main" val="990324362"/>
+        <p14:creationId xmlns:p14="http://schemas.microsoft.com/office/powerpoint/2010/main" val="2000553253"/>
       </p:ext>
     </p:extLst>
   </p:cSld>
@@ -838,15 +840,8 @@
           <a:p>
             <a:r>
               <a:rPr lang="en-US" dirty="0"/>
-              <a:t>Effect of edit command</a:t>
-            </a:r>
-          </a:p>
-          <a:p>
-            <a:r>
-              <a:rPr lang="en-GB" dirty="0"/>
-              <a:t>edit 1 n/Charity Fun Run t/</a:t>
-            </a:r>
-            <a:endParaRPr lang="en-US" dirty="0"/>
+              <a:t>EVENT_INDEX</a:t>
+            </a:r>
           </a:p>
         </p:txBody>
       </p:sp>
@@ -876,7 +871,7 @@
     </p:spTree>
     <p:extLst>
       <p:ext uri="{BB962C8B-B14F-4D97-AF65-F5344CB8AC3E}">
-        <p14:creationId xmlns:p14="http://schemas.microsoft.com/office/powerpoint/2010/main" val="1248699296"/>
+        <p14:creationId xmlns:p14="http://schemas.microsoft.com/office/powerpoint/2010/main" val="990324362"/>
       </p:ext>
     </p:extLst>
   </p:cSld>
@@ -932,15 +927,15 @@
           <a:p>
             <a:r>
               <a:rPr lang="en-US" dirty="0"/>
-              <a:t>Effect of delete command</a:t>
-            </a:r>
-          </a:p>
-          <a:p>
-            <a:r>
-              <a:rPr lang="en-US" dirty="0"/>
-              <a:t>delete 3</a:t>
-            </a:r>
-            <a:endParaRPr lang="en-SG" dirty="0"/>
+              <a:t>Effect of edit command</a:t>
+            </a:r>
+          </a:p>
+          <a:p>
+            <a:r>
+              <a:rPr lang="en-GB" dirty="0"/>
+              <a:t>edit 1 n/Charity Fun Run t/</a:t>
+            </a:r>
+            <a:endParaRPr lang="en-US" dirty="0"/>
           </a:p>
         </p:txBody>
       </p:sp>
@@ -951,7 +946,7 @@
             <a:spLocks noGrp="1"/>
           </p:cNvSpPr>
           <p:nvPr>
-            <p:ph type="sldNum" sz="quarter" idx="5"/>
+            <p:ph type="sldNum" sz="quarter" idx="10"/>
           </p:nvPr>
         </p:nvSpPr>
         <p:spPr/>
@@ -962,6 +957,188 @@
             <a:fld id="{B95B430D-E7DD-4DF8-8575-3B92DE16C99B}" type="slidenum">
               <a:rPr lang="en-SG" smtClean="0"/>
               <a:t>5</a:t>
+            </a:fld>
+            <a:endParaRPr lang="en-SG"/>
+          </a:p>
+        </p:txBody>
+      </p:sp>
+    </p:spTree>
+    <p:extLst>
+      <p:ext uri="{BB962C8B-B14F-4D97-AF65-F5344CB8AC3E}">
+        <p14:creationId xmlns:p14="http://schemas.microsoft.com/office/powerpoint/2010/main" val="1248699296"/>
+      </p:ext>
+    </p:extLst>
+  </p:cSld>
+  <p:clrMapOvr>
+    <a:masterClrMapping/>
+  </p:clrMapOvr>
+</p:notes>
+</file>
+
+<file path=ppt/notesSlides/notesSlide6.xml><?xml version="1.0" encoding="utf-8"?>
+<p:notes xmlns:a="http://schemas.openxmlformats.org/drawingml/2006/main" xmlns:r="http://schemas.openxmlformats.org/officeDocument/2006/relationships" xmlns:p="http://schemas.openxmlformats.org/presentationml/2006/main">
+  <p:cSld>
+    <p:spTree>
+      <p:nvGrpSpPr>
+        <p:cNvPr id="1" name=""/>
+        <p:cNvGrpSpPr/>
+        <p:nvPr/>
+      </p:nvGrpSpPr>
+      <p:grpSpPr>
+        <a:xfrm>
+          <a:off x="0" y="0"/>
+          <a:ext cx="0" cy="0"/>
+          <a:chOff x="0" y="0"/>
+          <a:chExt cx="0" cy="0"/>
+        </a:xfrm>
+      </p:grpSpPr>
+      <p:sp>
+        <p:nvSpPr>
+          <p:cNvPr id="2" name="Slide Image Placeholder 1"/>
+          <p:cNvSpPr>
+            <a:spLocks noGrp="1" noRot="1" noChangeAspect="1"/>
+          </p:cNvSpPr>
+          <p:nvPr>
+            <p:ph type="sldImg"/>
+          </p:nvPr>
+        </p:nvSpPr>
+        <p:spPr/>
+      </p:sp>
+      <p:sp>
+        <p:nvSpPr>
+          <p:cNvPr id="3" name="Notes Placeholder 2"/>
+          <p:cNvSpPr>
+            <a:spLocks noGrp="1"/>
+          </p:cNvSpPr>
+          <p:nvPr>
+            <p:ph type="body" idx="1"/>
+          </p:nvPr>
+        </p:nvSpPr>
+        <p:spPr/>
+        <p:txBody>
+          <a:bodyPr/>
+          <a:lstStyle/>
+          <a:p>
+            <a:r>
+              <a:rPr lang="en-US" dirty="0"/>
+              <a:t>Delete EVENT_INDEX</a:t>
+            </a:r>
+            <a:endParaRPr lang="en-SG" dirty="0"/>
+          </a:p>
+        </p:txBody>
+      </p:sp>
+      <p:sp>
+        <p:nvSpPr>
+          <p:cNvPr id="4" name="Slide Number Placeholder 3"/>
+          <p:cNvSpPr>
+            <a:spLocks noGrp="1"/>
+          </p:cNvSpPr>
+          <p:nvPr>
+            <p:ph type="sldNum" sz="quarter" idx="5"/>
+          </p:nvPr>
+        </p:nvSpPr>
+        <p:spPr/>
+        <p:txBody>
+          <a:bodyPr/>
+          <a:lstStyle/>
+          <a:p>
+            <a:fld id="{B95B430D-E7DD-4DF8-8575-3B92DE16C99B}" type="slidenum">
+              <a:rPr lang="en-SG" smtClean="0"/>
+              <a:t>6</a:t>
+            </a:fld>
+            <a:endParaRPr lang="en-SG"/>
+          </a:p>
+        </p:txBody>
+      </p:sp>
+    </p:spTree>
+    <p:extLst>
+      <p:ext uri="{BB962C8B-B14F-4D97-AF65-F5344CB8AC3E}">
+        <p14:creationId xmlns:p14="http://schemas.microsoft.com/office/powerpoint/2010/main" val="3556474078"/>
+      </p:ext>
+    </p:extLst>
+  </p:cSld>
+  <p:clrMapOvr>
+    <a:masterClrMapping/>
+  </p:clrMapOvr>
+</p:notes>
+</file>
+
+<file path=ppt/notesSlides/notesSlide7.xml><?xml version="1.0" encoding="utf-8"?>
+<p:notes xmlns:a="http://schemas.openxmlformats.org/drawingml/2006/main" xmlns:r="http://schemas.openxmlformats.org/officeDocument/2006/relationships" xmlns:p="http://schemas.openxmlformats.org/presentationml/2006/main">
+  <p:cSld>
+    <p:spTree>
+      <p:nvGrpSpPr>
+        <p:cNvPr id="1" name=""/>
+        <p:cNvGrpSpPr/>
+        <p:nvPr/>
+      </p:nvGrpSpPr>
+      <p:grpSpPr>
+        <a:xfrm>
+          <a:off x="0" y="0"/>
+          <a:ext cx="0" cy="0"/>
+          <a:chOff x="0" y="0"/>
+          <a:chExt cx="0" cy="0"/>
+        </a:xfrm>
+      </p:grpSpPr>
+      <p:sp>
+        <p:nvSpPr>
+          <p:cNvPr id="2" name="Slide Image Placeholder 1"/>
+          <p:cNvSpPr>
+            <a:spLocks noGrp="1" noRot="1" noChangeAspect="1"/>
+          </p:cNvSpPr>
+          <p:nvPr>
+            <p:ph type="sldImg"/>
+          </p:nvPr>
+        </p:nvSpPr>
+        <p:spPr/>
+      </p:sp>
+      <p:sp>
+        <p:nvSpPr>
+          <p:cNvPr id="3" name="Notes Placeholder 2"/>
+          <p:cNvSpPr>
+            <a:spLocks noGrp="1"/>
+          </p:cNvSpPr>
+          <p:nvPr>
+            <p:ph type="body" idx="1"/>
+          </p:nvPr>
+        </p:nvSpPr>
+        <p:spPr/>
+        <p:txBody>
+          <a:bodyPr/>
+          <a:lstStyle/>
+          <a:p>
+            <a:r>
+              <a:rPr lang="en-US" dirty="0"/>
+              <a:t>Effect of delete command</a:t>
+            </a:r>
+          </a:p>
+          <a:p>
+            <a:r>
+              <a:rPr lang="en-US" dirty="0"/>
+              <a:t>delete 3</a:t>
+            </a:r>
+            <a:endParaRPr lang="en-SG" dirty="0"/>
+          </a:p>
+        </p:txBody>
+      </p:sp>
+      <p:sp>
+        <p:nvSpPr>
+          <p:cNvPr id="4" name="Slide Number Placeholder 3"/>
+          <p:cNvSpPr>
+            <a:spLocks noGrp="1"/>
+          </p:cNvSpPr>
+          <p:nvPr>
+            <p:ph type="sldNum" sz="quarter" idx="5"/>
+          </p:nvPr>
+        </p:nvSpPr>
+        <p:spPr/>
+        <p:txBody>
+          <a:bodyPr/>
+          <a:lstStyle/>
+          <a:p>
+            <a:fld id="{B95B430D-E7DD-4DF8-8575-3B92DE16C99B}" type="slidenum">
+              <a:rPr lang="en-SG" smtClean="0"/>
+              <a:t>7</a:t>
             </a:fld>
             <a:endParaRPr lang="en-SG"/>
           </a:p>
@@ -4215,6 +4392,65 @@
           <a:chExt cx="0" cy="0"/>
         </a:xfrm>
       </p:grpSpPr>
+      <p:pic>
+        <p:nvPicPr>
+          <p:cNvPr id="5" name="Picture 4">
+            <a:extLst>
+              <a:ext uri="{FF2B5EF4-FFF2-40B4-BE49-F238E27FC236}">
+                <a16:creationId xmlns:a16="http://schemas.microsoft.com/office/drawing/2014/main" id="{54E6BD0F-5573-41B9-A233-2989062B9A6C}"/>
+              </a:ext>
+            </a:extLst>
+          </p:cNvPr>
+          <p:cNvPicPr>
+            <a:picLocks noChangeAspect="1"/>
+          </p:cNvPicPr>
+          <p:nvPr/>
+        </p:nvPicPr>
+        <p:blipFill rotWithShape="1">
+          <a:blip r:embed="rId3"/>
+          <a:srcRect b="45585"/>
+          <a:stretch/>
+        </p:blipFill>
+        <p:spPr>
+          <a:xfrm>
+            <a:off x="4085596" y="1383956"/>
+            <a:ext cx="4020807" cy="3731741"/>
+          </a:xfrm>
+          <a:prstGeom prst="rect">
+            <a:avLst/>
+          </a:prstGeom>
+        </p:spPr>
+      </p:pic>
+    </p:spTree>
+    <p:extLst>
+      <p:ext uri="{BB962C8B-B14F-4D97-AF65-F5344CB8AC3E}">
+        <p14:creationId xmlns:p14="http://schemas.microsoft.com/office/powerpoint/2010/main" val="1402971468"/>
+      </p:ext>
+    </p:extLst>
+  </p:cSld>
+  <p:clrMapOvr>
+    <a:masterClrMapping/>
+  </p:clrMapOvr>
+</p:sld>
+</file>
+
+<file path=ppt/slides/slide2.xml><?xml version="1.0" encoding="utf-8"?>
+<p:sld xmlns:a="http://schemas.openxmlformats.org/drawingml/2006/main" xmlns:r="http://schemas.openxmlformats.org/officeDocument/2006/relationships" xmlns:p="http://schemas.openxmlformats.org/presentationml/2006/main">
+  <p:cSld>
+    <p:spTree>
+      <p:nvGrpSpPr>
+        <p:cNvPr id="1" name=""/>
+        <p:cNvGrpSpPr/>
+        <p:nvPr/>
+      </p:nvGrpSpPr>
+      <p:grpSpPr>
+        <a:xfrm>
+          <a:off x="0" y="0"/>
+          <a:ext cx="0" cy="0"/>
+          <a:chOff x="0" y="0"/>
+          <a:chExt cx="0" cy="0"/>
+        </a:xfrm>
+      </p:grpSpPr>
       <p:sp>
         <p:nvSpPr>
           <p:cNvPr id="5" name="Arrow: Right 4">
@@ -4390,7 +4626,7 @@
 </p:sld>
 </file>
 
-<file path=ppt/slides/slide2.xml><?xml version="1.0" encoding="utf-8"?>
+<file path=ppt/slides/slide3.xml><?xml version="1.0" encoding="utf-8"?>
 <p:sld xmlns:a="http://schemas.openxmlformats.org/drawingml/2006/main" xmlns:r="http://schemas.openxmlformats.org/officeDocument/2006/relationships" xmlns:p="http://schemas.openxmlformats.org/presentationml/2006/main">
   <p:cSld>
     <p:spTree>
@@ -4582,7 +4818,7 @@
 </p:sld>
 </file>
 
-<file path=ppt/slides/slide3.xml><?xml version="1.0" encoding="utf-8"?>
+<file path=ppt/slides/slide4.xml><?xml version="1.0" encoding="utf-8"?>
 <p:sld xmlns:a="http://schemas.openxmlformats.org/drawingml/2006/main" xmlns:r="http://schemas.openxmlformats.org/officeDocument/2006/relationships" xmlns:p="http://schemas.openxmlformats.org/presentationml/2006/main">
   <p:cSld>
     <p:spTree>
@@ -4745,7 +4981,7 @@
 </p:sld>
 </file>
 
-<file path=ppt/slides/slide4.xml><?xml version="1.0" encoding="utf-8"?>
+<file path=ppt/slides/slide5.xml><?xml version="1.0" encoding="utf-8"?>
 <p:sld xmlns:a="http://schemas.openxmlformats.org/drawingml/2006/main" xmlns:r="http://schemas.openxmlformats.org/officeDocument/2006/relationships" xmlns:p="http://schemas.openxmlformats.org/presentationml/2006/main">
   <p:cSld>
     <p:spTree>
@@ -4887,7 +5123,7 @@
         <p:spPr>
           <a:xfrm>
             <a:off x="6822164" y="1421081"/>
-            <a:ext cx="4056295" cy="1559625"/>
+            <a:ext cx="4023360" cy="1559625"/>
           </a:xfrm>
           <a:prstGeom prst="rect">
             <a:avLst/>
@@ -4980,7 +5216,7 @@
 </p:sld>
 </file>
 
-<file path=ppt/slides/slide5.xml><?xml version="1.0" encoding="utf-8"?>
+<file path=ppt/slides/slide6.xml><?xml version="1.0" encoding="utf-8"?>
 <p:sld xmlns:a="http://schemas.openxmlformats.org/drawingml/2006/main" xmlns:r="http://schemas.openxmlformats.org/officeDocument/2006/relationships" xmlns:p="http://schemas.openxmlformats.org/presentationml/2006/main">
   <p:cSld>
     <p:spTree>
@@ -4999,10 +5235,10 @@
       </p:grpSpPr>
       <p:pic>
         <p:nvPicPr>
-          <p:cNvPr id="6" name="Picture 5">
-            <a:extLst>
-              <a:ext uri="{FF2B5EF4-FFF2-40B4-BE49-F238E27FC236}">
-                <a16:creationId xmlns:a16="http://schemas.microsoft.com/office/drawing/2014/main" id="{66940FCC-3ADF-48B0-8DCD-72B666E384F5}"/>
+          <p:cNvPr id="4" name="Picture 3">
+            <a:extLst>
+              <a:ext uri="{FF2B5EF4-FFF2-40B4-BE49-F238E27FC236}">
+                <a16:creationId xmlns:a16="http://schemas.microsoft.com/office/drawing/2014/main" id="{60BFB93C-53E2-4849-B67E-376DEA51945A}"/>
               </a:ext>
             </a:extLst>
           </p:cNvPr>
@@ -5013,13 +5249,228 @@
         </p:nvPicPr>
         <p:blipFill rotWithShape="1">
           <a:blip r:embed="rId3"/>
-          <a:srcRect b="23713"/>
+          <a:srcRect b="23782"/>
           <a:stretch/>
         </p:blipFill>
         <p:spPr>
           <a:xfrm>
-            <a:off x="1408115" y="803189"/>
-            <a:ext cx="4020807" cy="5267802"/>
+            <a:off x="4089989" y="803189"/>
+            <a:ext cx="4012021" cy="5251622"/>
+          </a:xfrm>
+          <a:prstGeom prst="rect">
+            <a:avLst/>
+          </a:prstGeom>
+        </p:spPr>
+      </p:pic>
+      <p:sp>
+        <p:nvSpPr>
+          <p:cNvPr id="5" name="Oval 4">
+            <a:extLst>
+              <a:ext uri="{FF2B5EF4-FFF2-40B4-BE49-F238E27FC236}">
+                <a16:creationId xmlns:a16="http://schemas.microsoft.com/office/drawing/2014/main" id="{5B2151B4-B9D6-4A70-AC08-848414348481}"/>
+              </a:ext>
+            </a:extLst>
+          </p:cNvPr>
+          <p:cNvSpPr/>
+          <p:nvPr/>
+        </p:nvSpPr>
+        <p:spPr>
+          <a:xfrm>
+            <a:off x="4283162" y="1561233"/>
+            <a:ext cx="304800" cy="332509"/>
+          </a:xfrm>
+          <a:prstGeom prst="ellipse">
+            <a:avLst/>
+          </a:prstGeom>
+          <a:noFill/>
+          <a:ln w="38100">
+            <a:solidFill>
+              <a:srgbClr val="FF0000"/>
+            </a:solidFill>
+          </a:ln>
+        </p:spPr>
+        <p:style>
+          <a:lnRef idx="2">
+            <a:schemeClr val="accent1">
+              <a:shade val="50000"/>
+            </a:schemeClr>
+          </a:lnRef>
+          <a:fillRef idx="1">
+            <a:schemeClr val="accent1"/>
+          </a:fillRef>
+          <a:effectRef idx="0">
+            <a:schemeClr val="accent1"/>
+          </a:effectRef>
+          <a:fontRef idx="minor">
+            <a:schemeClr val="lt1"/>
+          </a:fontRef>
+        </p:style>
+        <p:txBody>
+          <a:bodyPr rtlCol="0" anchor="ctr"/>
+          <a:lstStyle/>
+          <a:p>
+            <a:pPr algn="ctr"/>
+            <a:endParaRPr lang="en-SG"/>
+          </a:p>
+        </p:txBody>
+      </p:sp>
+      <p:sp>
+        <p:nvSpPr>
+          <p:cNvPr id="6" name="Oval 5">
+            <a:extLst>
+              <a:ext uri="{FF2B5EF4-FFF2-40B4-BE49-F238E27FC236}">
+                <a16:creationId xmlns:a16="http://schemas.microsoft.com/office/drawing/2014/main" id="{D85F7F73-0E53-4833-8739-9A5763D5090D}"/>
+              </a:ext>
+            </a:extLst>
+          </p:cNvPr>
+          <p:cNvSpPr/>
+          <p:nvPr/>
+        </p:nvSpPr>
+        <p:spPr>
+          <a:xfrm>
+            <a:off x="4283162" y="3108366"/>
+            <a:ext cx="304800" cy="332509"/>
+          </a:xfrm>
+          <a:prstGeom prst="ellipse">
+            <a:avLst/>
+          </a:prstGeom>
+          <a:noFill/>
+          <a:ln w="38100">
+            <a:solidFill>
+              <a:srgbClr val="FF0000"/>
+            </a:solidFill>
+          </a:ln>
+        </p:spPr>
+        <p:style>
+          <a:lnRef idx="2">
+            <a:schemeClr val="accent1">
+              <a:shade val="50000"/>
+            </a:schemeClr>
+          </a:lnRef>
+          <a:fillRef idx="1">
+            <a:schemeClr val="accent1"/>
+          </a:fillRef>
+          <a:effectRef idx="0">
+            <a:schemeClr val="accent1"/>
+          </a:effectRef>
+          <a:fontRef idx="minor">
+            <a:schemeClr val="lt1"/>
+          </a:fontRef>
+        </p:style>
+        <p:txBody>
+          <a:bodyPr rtlCol="0" anchor="ctr"/>
+          <a:lstStyle/>
+          <a:p>
+            <a:pPr algn="ctr"/>
+            <a:endParaRPr lang="en-SG"/>
+          </a:p>
+        </p:txBody>
+      </p:sp>
+      <p:sp>
+        <p:nvSpPr>
+          <p:cNvPr id="7" name="Oval 6">
+            <a:extLst>
+              <a:ext uri="{FF2B5EF4-FFF2-40B4-BE49-F238E27FC236}">
+                <a16:creationId xmlns:a16="http://schemas.microsoft.com/office/drawing/2014/main" id="{F78465FA-FC79-49E8-A13F-4F1DF0CBDF2A}"/>
+              </a:ext>
+            </a:extLst>
+          </p:cNvPr>
+          <p:cNvSpPr/>
+          <p:nvPr/>
+        </p:nvSpPr>
+        <p:spPr>
+          <a:xfrm>
+            <a:off x="4283162" y="4655499"/>
+            <a:ext cx="304800" cy="332509"/>
+          </a:xfrm>
+          <a:prstGeom prst="ellipse">
+            <a:avLst/>
+          </a:prstGeom>
+          <a:noFill/>
+          <a:ln w="38100">
+            <a:solidFill>
+              <a:srgbClr val="FF0000"/>
+            </a:solidFill>
+          </a:ln>
+        </p:spPr>
+        <p:style>
+          <a:lnRef idx="2">
+            <a:schemeClr val="accent1">
+              <a:shade val="50000"/>
+            </a:schemeClr>
+          </a:lnRef>
+          <a:fillRef idx="1">
+            <a:schemeClr val="accent1"/>
+          </a:fillRef>
+          <a:effectRef idx="0">
+            <a:schemeClr val="accent1"/>
+          </a:effectRef>
+          <a:fontRef idx="minor">
+            <a:schemeClr val="lt1"/>
+          </a:fontRef>
+        </p:style>
+        <p:txBody>
+          <a:bodyPr rtlCol="0" anchor="ctr"/>
+          <a:lstStyle/>
+          <a:p>
+            <a:pPr algn="ctr"/>
+            <a:endParaRPr lang="en-SG"/>
+          </a:p>
+        </p:txBody>
+      </p:sp>
+    </p:spTree>
+    <p:extLst>
+      <p:ext uri="{BB962C8B-B14F-4D97-AF65-F5344CB8AC3E}">
+        <p14:creationId xmlns:p14="http://schemas.microsoft.com/office/powerpoint/2010/main" val="3808055541"/>
+      </p:ext>
+    </p:extLst>
+  </p:cSld>
+  <p:clrMapOvr>
+    <a:masterClrMapping/>
+  </p:clrMapOvr>
+</p:sld>
+</file>
+
+<file path=ppt/slides/slide7.xml><?xml version="1.0" encoding="utf-8"?>
+<p:sld xmlns:a="http://schemas.openxmlformats.org/drawingml/2006/main" xmlns:r="http://schemas.openxmlformats.org/officeDocument/2006/relationships" xmlns:p="http://schemas.openxmlformats.org/presentationml/2006/main">
+  <p:cSld>
+    <p:spTree>
+      <p:nvGrpSpPr>
+        <p:cNvPr id="1" name=""/>
+        <p:cNvGrpSpPr/>
+        <p:nvPr/>
+      </p:nvGrpSpPr>
+      <p:grpSpPr>
+        <a:xfrm>
+          <a:off x="0" y="0"/>
+          <a:ext cx="0" cy="0"/>
+          <a:chOff x="0" y="0"/>
+          <a:chExt cx="0" cy="0"/>
+        </a:xfrm>
+      </p:grpSpPr>
+      <p:pic>
+        <p:nvPicPr>
+          <p:cNvPr id="11" name="Picture 10">
+            <a:extLst>
+              <a:ext uri="{FF2B5EF4-FFF2-40B4-BE49-F238E27FC236}">
+                <a16:creationId xmlns:a16="http://schemas.microsoft.com/office/drawing/2014/main" id="{6D9EF782-120E-438E-9A04-6E8472EDE073}"/>
+              </a:ext>
+            </a:extLst>
+          </p:cNvPr>
+          <p:cNvPicPr>
+            <a:picLocks noChangeAspect="1"/>
+          </p:cNvPicPr>
+          <p:nvPr/>
+        </p:nvPicPr>
+        <p:blipFill rotWithShape="1">
+          <a:blip r:embed="rId3"/>
+          <a:srcRect t="1" b="46164"/>
+          <a:stretch/>
+        </p:blipFill>
+        <p:spPr>
+          <a:xfrm>
+            <a:off x="6813056" y="803189"/>
+            <a:ext cx="4012021" cy="3709434"/>
           </a:xfrm>
           <a:prstGeom prst="rect">
             <a:avLst/>
@@ -5080,10 +5531,10 @@
       </p:sp>
       <p:pic>
         <p:nvPicPr>
-          <p:cNvPr id="8" name="Picture 7">
-            <a:extLst>
-              <a:ext uri="{FF2B5EF4-FFF2-40B4-BE49-F238E27FC236}">
-                <a16:creationId xmlns:a16="http://schemas.microsoft.com/office/drawing/2014/main" id="{BF6D39E5-4DC9-4595-B01A-3631258A9210}"/>
+          <p:cNvPr id="10" name="Picture 9">
+            <a:extLst>
+              <a:ext uri="{FF2B5EF4-FFF2-40B4-BE49-F238E27FC236}">
+                <a16:creationId xmlns:a16="http://schemas.microsoft.com/office/drawing/2014/main" id="{F2B3B8C6-C358-42EC-B5C3-3940C3FE4111}"/>
               </a:ext>
             </a:extLst>
           </p:cNvPr>
@@ -5094,19 +5545,71 @@
         </p:nvPicPr>
         <p:blipFill rotWithShape="1">
           <a:blip r:embed="rId3"/>
-          <a:srcRect b="46281"/>
+          <a:srcRect b="23782"/>
           <a:stretch/>
         </p:blipFill>
         <p:spPr>
           <a:xfrm>
-            <a:off x="6804269" y="803189"/>
-            <a:ext cx="4020807" cy="3709434"/>
+            <a:off x="1408114" y="803189"/>
+            <a:ext cx="4012021" cy="5251622"/>
           </a:xfrm>
           <a:prstGeom prst="rect">
             <a:avLst/>
           </a:prstGeom>
         </p:spPr>
       </p:pic>
+      <p:sp>
+        <p:nvSpPr>
+          <p:cNvPr id="12" name="Rectangle 11">
+            <a:extLst>
+              <a:ext uri="{FF2B5EF4-FFF2-40B4-BE49-F238E27FC236}">
+                <a16:creationId xmlns:a16="http://schemas.microsoft.com/office/drawing/2014/main" id="{71AFF40A-8AC3-4D2A-8110-A8420D0C6501}"/>
+              </a:ext>
+            </a:extLst>
+          </p:cNvPr>
+          <p:cNvSpPr/>
+          <p:nvPr/>
+        </p:nvSpPr>
+        <p:spPr>
+          <a:xfrm>
+            <a:off x="6829111" y="4512623"/>
+            <a:ext cx="3979616" cy="1549742"/>
+          </a:xfrm>
+          <a:prstGeom prst="rect">
+            <a:avLst/>
+          </a:prstGeom>
+          <a:noFill/>
+          <a:ln w="38100">
+            <a:solidFill>
+              <a:srgbClr val="FF0000"/>
+            </a:solidFill>
+          </a:ln>
+        </p:spPr>
+        <p:style>
+          <a:lnRef idx="2">
+            <a:schemeClr val="accent1">
+              <a:shade val="50000"/>
+            </a:schemeClr>
+          </a:lnRef>
+          <a:fillRef idx="1">
+            <a:schemeClr val="accent1"/>
+          </a:fillRef>
+          <a:effectRef idx="0">
+            <a:schemeClr val="accent1"/>
+          </a:effectRef>
+          <a:fontRef idx="minor">
+            <a:schemeClr val="lt1"/>
+          </a:fontRef>
+        </p:style>
+        <p:txBody>
+          <a:bodyPr rtlCol="0" anchor="ctr"/>
+          <a:lstStyle/>
+          <a:p>
+            <a:pPr algn="ctr"/>
+            <a:endParaRPr lang="en-SG" dirty="0"/>
+          </a:p>
+        </p:txBody>
+      </p:sp>
     </p:spTree>
     <p:extLst>
       <p:ext uri="{BB962C8B-B14F-4D97-AF65-F5344CB8AC3E}">

</xml_diff>